<commit_message>
after Paris Training 2010
</commit_message>
<xml_diff>
--- a/slides/exo-fundamentals/en/030-Portal-Intro-XFund-en.pptx
+++ b/slides/exo-fundamentals/en/030-Portal-Intro-XFund-en.pptx
@@ -29165,11 +29165,6 @@
               </a:rPr>
               <a:t>://localhost:8080/portal/public/acme</a:t>
             </a:r>
-            <a:endParaRPr lang="en-GB" sz="2000" b="1" i="1" dirty="0">
-              <a:solidFill>
-                <a:srgbClr val="4C4C4C"/>
-              </a:solidFill>
-            </a:endParaRPr>
           </a:p>
         </p:txBody>
       </p:sp>
@@ -29451,11 +29446,6 @@
               </a:rPr>
               <a:t>://localhost:8080/portal/public/acme</a:t>
             </a:r>
-            <a:endParaRPr lang="en-GB" sz="2000" b="1" i="1" dirty="0">
-              <a:solidFill>
-                <a:srgbClr val="4C4C4C"/>
-              </a:solidFill>
-            </a:endParaRPr>
           </a:p>
         </p:txBody>
       </p:sp>
@@ -29949,15 +29939,7 @@
                   <a:srgbClr val="4C4C4C"/>
                 </a:solidFill>
               </a:rPr>
-              <a:t>eXo Platform is </a:t>
-            </a:r>
-            <a:r>
-              <a:rPr lang="en-GB" sz="2000" b="1" i="1" dirty="0" smtClean="0">
-                <a:solidFill>
-                  <a:srgbClr val="4C4C4C"/>
-                </a:solidFill>
-              </a:rPr>
-              <a:t>available in 16 languages</a:t>
+              <a:t>eXo Platform is available in 16 languages</a:t>
             </a:r>
           </a:p>
           <a:p>
@@ -30281,15 +30263,7 @@
                   <a:srgbClr val="4C4C4C"/>
                 </a:solidFill>
               </a:rPr>
-              <a:t>After login: The </a:t>
-            </a:r>
-            <a:r>
-              <a:rPr lang="en-GB" sz="2000" b="1" i="1" dirty="0" smtClean="0">
-                <a:solidFill>
-                  <a:srgbClr val="4C4C4C"/>
-                </a:solidFill>
-              </a:rPr>
-              <a:t>choice is stored in </a:t>
+              <a:t>After login: The choice is stored in </a:t>
             </a:r>
             <a:br>
               <a:rPr lang="en-GB" sz="2000" b="1" i="1" dirty="0" smtClean="0">
@@ -30304,15 +30278,7 @@
                   <a:srgbClr val="4C4C4C"/>
                 </a:solidFill>
               </a:rPr>
-              <a:t>the user preferences</a:t>
-            </a:r>
-            <a:r>
-              <a:rPr lang="en-GB" sz="2000" b="1" i="1" dirty="0" smtClean="0">
-                <a:solidFill>
-                  <a:srgbClr val="4C4C4C"/>
-                </a:solidFill>
-              </a:rPr>
-              <a:t>.</a:t>
+              <a:t>the user preferences.</a:t>
             </a:r>
           </a:p>
           <a:p>
@@ -31737,15 +31703,7 @@
                   <a:srgbClr val="4C4C4C"/>
                 </a:solidFill>
               </a:rPr>
-              <a:t>The </a:t>
-            </a:r>
-            <a:r>
-              <a:rPr lang="en-GB" sz="2000" b="1" i="1" dirty="0" smtClean="0">
-                <a:solidFill>
-                  <a:srgbClr val="4C4C4C"/>
-                </a:solidFill>
-              </a:rPr>
-              <a:t>Admin Tool Bar contains menu entries for:</a:t>
+              <a:t>The Admin Tool Bar contains menu entries for:</a:t>
             </a:r>
           </a:p>
           <a:p>
@@ -31839,15 +31797,7 @@
                   <a:srgbClr val="4C4C4C"/>
                 </a:solidFill>
               </a:rPr>
-              <a:t>Spaces (Groups) </a:t>
-            </a:r>
-            <a:r>
-              <a:rPr lang="en-GB" sz="2000" b="1" i="1" dirty="0" smtClean="0">
-                <a:solidFill>
-                  <a:srgbClr val="4C4C4C"/>
-                </a:solidFill>
-              </a:rPr>
-              <a:t>of the current user</a:t>
+              <a:t>Spaces (Groups) of the current user</a:t>
             </a:r>
           </a:p>
           <a:p>
@@ -33255,15 +33205,7 @@
                   <a:srgbClr val="4C4C4C"/>
                 </a:solidFill>
               </a:rPr>
-              <a:t>Each user sees only the navigations of her or his </a:t>
-            </a:r>
-            <a:r>
-              <a:rPr lang="en-GB" sz="2000" b="1" i="1" dirty="0" smtClean="0">
-                <a:solidFill>
-                  <a:srgbClr val="4C4C4C"/>
-                </a:solidFill>
-              </a:rPr>
-              <a:t>spaces/groups</a:t>
+              <a:t>Each user sees only the navigations of her or his spaces/groups</a:t>
             </a:r>
             <a:endParaRPr lang="en-GB" sz="2000" b="1" i="1" dirty="0">
               <a:solidFill>
@@ -33336,15 +33278,7 @@
                   <a:srgbClr val="FFA300"/>
                 </a:solidFill>
               </a:rPr>
-              <a:t>Admin Tool Bar </a:t>
-            </a:r>
-            <a:r>
-              <a:rPr lang="en-GB" sz="3600" dirty="0" smtClean="0">
-                <a:solidFill>
-                  <a:srgbClr val="FFA300"/>
-                </a:solidFill>
-              </a:rPr>
-              <a:t>– Space Navigations</a:t>
+              <a:t>Admin Tool Bar – Space Navigations</a:t>
             </a:r>
             <a:endParaRPr lang="en-GB" sz="3600" dirty="0">
               <a:solidFill>
@@ -33671,15 +33605,7 @@
                   <a:srgbClr val="FFA300"/>
                 </a:solidFill>
               </a:rPr>
-              <a:t>Admin Tool Bar </a:t>
-            </a:r>
-            <a:r>
-              <a:rPr lang="en-GB" sz="3600" dirty="0" smtClean="0">
-                <a:solidFill>
-                  <a:srgbClr val="FFA300"/>
-                </a:solidFill>
-              </a:rPr>
-              <a:t>– Group Editor</a:t>
+              <a:t>Admin Tool Bar – Group Editor</a:t>
             </a:r>
             <a:endParaRPr lang="en-GB" sz="3600" dirty="0">
               <a:solidFill>
@@ -34783,15 +34709,7 @@
                   <a:srgbClr val="4C4C4C"/>
                 </a:solidFill>
               </a:rPr>
-              <a:t>Groups </a:t>
-            </a:r>
-            <a:r>
-              <a:rPr lang="en-GB" sz="2000" b="1" i="1" dirty="0" smtClean="0">
-                <a:solidFill>
-                  <a:srgbClr val="4C4C4C"/>
-                </a:solidFill>
-              </a:rPr>
-              <a:t>of the current user</a:t>
+              <a:t>Groups of the current user</a:t>
             </a:r>
             <a:br>
               <a:rPr lang="en-GB" sz="2000" b="1" i="1" dirty="0" smtClean="0">
@@ -37856,21 +37774,8 @@
                   <a:srgbClr val="4C4C4C"/>
                 </a:solidFill>
               </a:rPr>
-              <a:t>Create a directory $TRAINING_HOME and unzip </a:t>
-            </a:r>
-            <a:r>
-              <a:rPr lang="en-GB" sz="2000" b="1" i="1" dirty="0" smtClean="0">
-                <a:solidFill>
-                  <a:srgbClr val="4C4C4C"/>
-                </a:solidFill>
-              </a:rPr>
-              <a:t>eXoPlatform-3.0.0-GA.zip</a:t>
-            </a:r>
-            <a:endParaRPr lang="en-GB" sz="2000" b="1" i="1" dirty="0" smtClean="0">
-              <a:solidFill>
-                <a:srgbClr val="4C4C4C"/>
-              </a:solidFill>
-            </a:endParaRPr>
+              <a:t>Create a directory $TRAINING_HOME and unzip eXoPlatform-3.0.0-GA.zip</a:t>
+            </a:r>
           </a:p>
           <a:p>
             <a:pPr marL="258763" indent="-255588" hangingPunct="1">
@@ -37965,11 +37870,6 @@
               </a:rPr>
               <a:t>...\eXoPlatform-3.0.0-GA\bin\tomcat6-bundle\bin</a:t>
             </a:r>
-            <a:endParaRPr lang="en-GB" sz="2000" b="1" i="1" dirty="0" smtClean="0">
-              <a:solidFill>
-                <a:srgbClr val="4C4C4C"/>
-              </a:solidFill>
-            </a:endParaRPr>
           </a:p>
           <a:p>
             <a:pPr marL="258763" indent="-255588" hangingPunct="1">
@@ -38719,23 +38619,7 @@
                   <a:schemeClr val="tx1"/>
                 </a:solidFill>
               </a:rPr>
-              <a:t>You can also use : </a:t>
-            </a:r>
-            <a:r>
-              <a:rPr lang="en-US" sz="2000" b="1" i="1" dirty="0" smtClean="0">
-                <a:solidFill>
-                  <a:schemeClr val="tx1"/>
-                </a:solidFill>
-              </a:rPr>
-              <a:t>./gatein.sh </a:t>
-            </a:r>
-            <a:r>
-              <a:rPr lang="en-US" sz="2000" b="1" i="1" dirty="0" smtClean="0">
-                <a:solidFill>
-                  <a:schemeClr val="tx1"/>
-                </a:solidFill>
-              </a:rPr>
-              <a:t>stop</a:t>
+              <a:t>You can also use : ./gatein.sh stop</a:t>
             </a:r>
           </a:p>
           <a:p>
@@ -39198,15 +39082,7 @@
                   <a:schemeClr val="tx1"/>
                 </a:solidFill>
               </a:rPr>
-              <a:t>Switch to </a:t>
-            </a:r>
-            <a:r>
-              <a:rPr lang="en-GB" sz="2000" b="1" i="1" dirty="0" smtClean="0">
-                <a:solidFill>
-                  <a:schemeClr val="tx1"/>
-                </a:solidFill>
-              </a:rPr>
-              <a:t>Acme Website</a:t>
+              <a:t>Switch to Acme Website</a:t>
             </a:r>
           </a:p>
           <a:p>
@@ -39253,15 +39129,7 @@
                   <a:schemeClr val="tx1"/>
                 </a:solidFill>
               </a:rPr>
-              <a:t>Before </a:t>
-            </a:r>
-            <a:r>
-              <a:rPr lang="en-GB" sz="2000" b="1" i="1" dirty="0" smtClean="0">
-                <a:solidFill>
-                  <a:schemeClr val="tx1"/>
-                </a:solidFill>
-              </a:rPr>
-              <a:t>logging in, change the language</a:t>
+              <a:t>Before logging in, change the language</a:t>
             </a:r>
           </a:p>
           <a:p>
@@ -39326,11 +39194,6 @@
               </a:rPr>
               <a:t>ary</a:t>
             </a:r>
-            <a:endParaRPr lang="en-GB" sz="2000" b="1" i="1" dirty="0" smtClean="0">
-              <a:solidFill>
-                <a:schemeClr val="tx1"/>
-              </a:solidFill>
-            </a:endParaRPr>
           </a:p>
           <a:p>
             <a:pPr marL="258763" indent="-255588" hangingPunct="1">
@@ -39376,21 +39239,8 @@
                   <a:schemeClr val="tx1"/>
                 </a:solidFill>
               </a:rPr>
-              <a:t>Change the language for M</a:t>
-            </a:r>
-            <a:r>
-              <a:rPr lang="en-GB" sz="2000" b="1" i="1" dirty="0" smtClean="0">
-                <a:solidFill>
-                  <a:schemeClr val="tx1"/>
-                </a:solidFill>
-              </a:rPr>
-              <a:t>ary</a:t>
-            </a:r>
-            <a:endParaRPr lang="en-GB" sz="2000" b="1" i="1" dirty="0" smtClean="0">
-              <a:solidFill>
-                <a:schemeClr val="tx1"/>
-              </a:solidFill>
-            </a:endParaRPr>
+              <a:t>Change the language for Mary</a:t>
+            </a:r>
           </a:p>
           <a:p>
             <a:pPr marL="258763" indent="-255588" hangingPunct="1">
@@ -39454,11 +39304,6 @@
               </a:rPr>
               <a:t>ary</a:t>
             </a:r>
-            <a:endParaRPr lang="en-GB" sz="2000" b="1" i="1" dirty="0" smtClean="0">
-              <a:solidFill>
-                <a:schemeClr val="tx1"/>
-              </a:solidFill>
-            </a:endParaRPr>
           </a:p>
           <a:p>
             <a:pPr marL="258763" indent="-255588" hangingPunct="1">
@@ -39883,21 +39728,8 @@
                   <a:schemeClr val="tx1"/>
                 </a:solidFill>
               </a:rPr>
-              <a:t>Log in as </a:t>
-            </a:r>
-            <a:r>
-              <a:rPr lang="en-GB" sz="2000" b="1" i="1" dirty="0" smtClean="0">
-                <a:solidFill>
-                  <a:schemeClr val="tx1"/>
-                </a:solidFill>
-              </a:rPr>
-              <a:t>Mary</a:t>
-            </a:r>
-            <a:endParaRPr lang="en-GB" sz="2000" b="1" i="1" dirty="0" smtClean="0">
-              <a:solidFill>
-                <a:schemeClr val="tx1"/>
-              </a:solidFill>
-            </a:endParaRPr>
+              <a:t>Log in as Mary</a:t>
+            </a:r>
           </a:p>
           <a:p>
             <a:pPr marL="258763" indent="-255588" hangingPunct="1">
@@ -39990,21 +39822,8 @@
                   <a:schemeClr val="tx1"/>
                 </a:solidFill>
               </a:rPr>
-              <a:t>Log in as </a:t>
-            </a:r>
-            <a:r>
-              <a:rPr lang="en-GB" sz="2000" b="1" i="1" dirty="0" smtClean="0">
-                <a:solidFill>
-                  <a:schemeClr val="tx1"/>
-                </a:solidFill>
-              </a:rPr>
-              <a:t>John</a:t>
-            </a:r>
-            <a:endParaRPr lang="en-GB" sz="2000" b="1" i="1" dirty="0" smtClean="0">
-              <a:solidFill>
-                <a:schemeClr val="tx1"/>
-              </a:solidFill>
-            </a:endParaRPr>
+              <a:t>Log in as John</a:t>
+            </a:r>
           </a:p>
           <a:p>
             <a:pPr marL="258763" indent="-255588" hangingPunct="1">
@@ -40050,21 +39869,8 @@
                   <a:schemeClr val="tx1"/>
                 </a:solidFill>
               </a:rPr>
-              <a:t>Verify that his dashboard is </a:t>
-            </a:r>
-            <a:r>
-              <a:rPr lang="en-GB" sz="2000" b="1" i="1" dirty="0" smtClean="0">
-                <a:solidFill>
-                  <a:schemeClr val="tx1"/>
-                </a:solidFill>
-              </a:rPr>
-              <a:t>empty (remember that the dashboard is personal)</a:t>
-            </a:r>
-            <a:endParaRPr lang="en-GB" sz="2000" b="1" i="1" dirty="0" smtClean="0">
-              <a:solidFill>
-                <a:schemeClr val="tx1"/>
-              </a:solidFill>
-            </a:endParaRPr>
+              <a:t>Verify that his dashboard is empty (remember that the dashboard is personal)</a:t>
+            </a:r>
           </a:p>
           <a:p>
             <a:pPr marL="258763" indent="-255588" hangingPunct="1">
@@ -40110,21 +39916,8 @@
                   <a:schemeClr val="tx1"/>
                 </a:solidFill>
               </a:rPr>
-              <a:t>Create a dashboard for </a:t>
-            </a:r>
-            <a:r>
-              <a:rPr lang="en-GB" sz="2000" b="1" i="1" dirty="0" smtClean="0">
-                <a:solidFill>
-                  <a:schemeClr val="tx1"/>
-                </a:solidFill>
-              </a:rPr>
-              <a:t>John</a:t>
-            </a:r>
-            <a:endParaRPr lang="en-GB" sz="2000" b="1" i="1" dirty="0" smtClean="0">
-              <a:solidFill>
-                <a:schemeClr val="tx1"/>
-              </a:solidFill>
-            </a:endParaRPr>
+              <a:t>Create a dashboard for John</a:t>
+            </a:r>
           </a:p>
           <a:p>
             <a:pPr marL="258763" indent="-255588" hangingPunct="1">
@@ -43757,15 +43550,7 @@
                   <a:srgbClr val="FFA300"/>
                 </a:solidFill>
               </a:rPr>
-              <a:t>Memberships: </a:t>
-            </a:r>
-            <a:r>
-              <a:rPr lang="en-GB" sz="3600" dirty="0" smtClean="0">
-                <a:solidFill>
-                  <a:srgbClr val="FFA300"/>
-                </a:solidFill>
-              </a:rPr>
-              <a:t>Remarks</a:t>
+              <a:t>Memberships: Remarks</a:t>
             </a:r>
             <a:endParaRPr lang="en-GB" sz="3600" dirty="0">
               <a:solidFill>
@@ -44321,21 +44106,8 @@
                   <a:schemeClr val="tx1"/>
                 </a:solidFill>
               </a:rPr>
-              <a:t>Login as </a:t>
-            </a:r>
-            <a:r>
-              <a:rPr lang="en-US" sz="2000" b="1" i="1" dirty="0" smtClean="0">
-                <a:solidFill>
-                  <a:schemeClr val="tx1"/>
-                </a:solidFill>
-              </a:rPr>
-              <a:t>John.</a:t>
-            </a:r>
-            <a:endParaRPr lang="en-US" sz="2000" b="1" i="1" dirty="0" smtClean="0">
-              <a:solidFill>
-                <a:schemeClr val="tx1"/>
-              </a:solidFill>
-            </a:endParaRPr>
+              <a:t>Login as John.</a:t>
+            </a:r>
           </a:p>
           <a:p>
             <a:pPr marL="258763" indent="-255588" hangingPunct="1">
@@ -45228,11 +45000,7 @@
             <a:pPr marL="584962" lvl="1" indent="-219361"/>
             <a:r>
               <a:rPr lang="en-US" dirty="0" smtClean="0"/>
-              <a:t>Standard </a:t>
-            </a:r>
-            <a:r>
-              <a:rPr lang="en-US" dirty="0" smtClean="0"/>
-              <a:t>Respect</a:t>
+              <a:t>Standard Respect</a:t>
             </a:r>
           </a:p>
           <a:p>
@@ -46017,11 +45785,6 @@
               </a:rPr>
               <a:t>public/default/</a:t>
             </a:r>
-            <a:endParaRPr lang="en-GB" sz="1800" b="1" i="1" dirty="0">
-              <a:solidFill>
-                <a:srgbClr val="4C4C4C"/>
-              </a:solidFill>
-            </a:endParaRPr>
           </a:p>
         </p:txBody>
       </p:sp>
@@ -46212,7 +45975,7 @@
                   <a:srgbClr val="FFA300"/>
                 </a:solidFill>
               </a:rPr>
-              <a:t>Homepage</a:t>
+              <a:t>eXo Platform Homepage</a:t>
             </a:r>
             <a:endParaRPr lang="en-GB" sz="3600" dirty="0">
               <a:solidFill>

</xml_diff>

<commit_message>
Corrections for Vauban training
</commit_message>
<xml_diff>
--- a/slides/exo-fundamentals/en/030-Portal-Intro-XFund-en.pptx
+++ b/slides/exo-fundamentals/en/030-Portal-Intro-XFund-en.pptx
@@ -736,7 +736,7 @@
             <a:fld id="{8C54DCBC-1FA6-4D91-9295-DE7087ED7B51}" type="slidenum">
               <a:rPr lang="en-GB"/>
               <a:pPr/>
-              <a:t>‹nº›</a:t>
+              <a:t>‹#›</a:t>
             </a:fld>
             <a:endParaRPr lang="en-GB"/>
           </a:p>
@@ -11152,7 +11152,7 @@
                   <a:tab pos="9144000" algn="l"/>
                 </a:tabLst>
               </a:pPr>
-              <a:t>‹nº›</a:t>
+              <a:t>‹#›</a:t>
             </a:fld>
             <a:endParaRPr lang="en-GB" sz="1400">
               <a:solidFill>
@@ -11448,7 +11448,7 @@
   <p:clrMapOvr>
     <a:masterClrMapping/>
   </p:clrMapOvr>
-  <p:transition/>
+  <p:transition xmlns:p14="http://schemas.microsoft.com/office/powerpoint/2010/main"/>
 </p:sldLayout>
 </file>
 
@@ -11567,7 +11567,7 @@
                   <a:tab pos="9144000" algn="l"/>
                 </a:tabLst>
               </a:pPr>
-              <a:t>‹nº›</a:t>
+              <a:t>‹#›</a:t>
             </a:fld>
             <a:endParaRPr lang="en-GB" sz="1400">
               <a:solidFill>
@@ -12035,7 +12035,7 @@
                   <a:tab pos="9144000" algn="l"/>
                 </a:tabLst>
               </a:pPr>
-              <a:t>‹nº›</a:t>
+              <a:t>‹#›</a:t>
             </a:fld>
             <a:endParaRPr lang="en-GB" sz="1400">
               <a:solidFill>
@@ -12194,7 +12194,7 @@
                   <a:tab pos="9144000" algn="l"/>
                 </a:tabLst>
               </a:pPr>
-              <a:t>‹nº›</a:t>
+              <a:t>‹#›</a:t>
             </a:fld>
             <a:endParaRPr lang="en-GB" sz="1400">
               <a:solidFill>
@@ -12330,7 +12330,7 @@
                   <a:tab pos="9144000" algn="l"/>
                 </a:tabLst>
               </a:pPr>
-              <a:t>‹nº›</a:t>
+              <a:t>‹#›</a:t>
             </a:fld>
             <a:endParaRPr lang="en-GB" sz="1400">
               <a:solidFill>
@@ -12648,7 +12648,7 @@
                   <a:tab pos="9144000" algn="l"/>
                 </a:tabLst>
               </a:pPr>
-              <a:t>‹nº›</a:t>
+              <a:t>‹#›</a:t>
             </a:fld>
             <a:endParaRPr lang="en-GB" sz="1400">
               <a:solidFill>
@@ -12946,7 +12946,7 @@
                   <a:tab pos="9144000" algn="l"/>
                 </a:tabLst>
               </a:pPr>
-              <a:t>‹nº›</a:t>
+              <a:t>‹#›</a:t>
             </a:fld>
             <a:endParaRPr lang="en-GB" sz="1400">
               <a:solidFill>
@@ -13157,7 +13157,7 @@
                   <a:tab pos="9144000" algn="l"/>
                 </a:tabLst>
               </a:pPr>
-              <a:t>‹nº›</a:t>
+              <a:t>‹#›</a:t>
             </a:fld>
             <a:endParaRPr lang="en-GB" sz="1400">
               <a:solidFill>
@@ -13596,7 +13596,7 @@
                   <a:tab pos="9144000" algn="l"/>
                 </a:tabLst>
               </a:pPr>
-              <a:t>‹nº›</a:t>
+              <a:t>‹#›</a:t>
             </a:fld>
             <a:endParaRPr lang="en-GB" sz="1400">
               <a:solidFill>
@@ -14247,7 +14247,7 @@
   <p:clrMapOvr>
     <a:masterClrMapping/>
   </p:clrMapOvr>
-  <p:transition/>
+  <p:transition xmlns:p14="http://schemas.microsoft.com/office/powerpoint/2010/main"/>
 </p:sldLayout>
 </file>
 
@@ -14636,7 +14636,7 @@
   <p:clrMapOvr>
     <a:masterClrMapping/>
   </p:clrMapOvr>
-  <p:transition/>
+  <p:transition xmlns:p14="http://schemas.microsoft.com/office/powerpoint/2010/main"/>
 </p:sldLayout>
 </file>
 
@@ -14940,7 +14940,7 @@
   <p:clrMapOvr>
     <a:masterClrMapping/>
   </p:clrMapOvr>
-  <p:transition/>
+  <p:transition xmlns:p14="http://schemas.microsoft.com/office/powerpoint/2010/main"/>
 </p:sldLayout>
 </file>
 
@@ -15244,7 +15244,7 @@
   <p:clrMapOvr>
     <a:masterClrMapping/>
   </p:clrMapOvr>
-  <p:transition/>
+  <p:transition xmlns:p14="http://schemas.microsoft.com/office/powerpoint/2010/main"/>
 </p:sldLayout>
 </file>
 
@@ -15548,7 +15548,7 @@
   <p:clrMapOvr>
     <a:masterClrMapping/>
   </p:clrMapOvr>
-  <p:transition/>
+  <p:transition xmlns:p14="http://schemas.microsoft.com/office/powerpoint/2010/main"/>
 </p:sldLayout>
 </file>
 
@@ -15852,7 +15852,7 @@
   <p:clrMapOvr>
     <a:masterClrMapping/>
   </p:clrMapOvr>
-  <p:transition/>
+  <p:transition xmlns:p14="http://schemas.microsoft.com/office/powerpoint/2010/main"/>
 </p:sldLayout>
 </file>
 
@@ -17242,7 +17242,7 @@
                   <a:tab pos="9144000" algn="l"/>
                 </a:tabLst>
               </a:pPr>
-              <a:t>‹nº›</a:t>
+              <a:t>‹#›</a:t>
             </a:fld>
             <a:endParaRPr lang="en-GB" sz="1400">
               <a:solidFill>
@@ -17575,7 +17575,7 @@
                   <a:tab pos="9144000" algn="l"/>
                 </a:tabLst>
               </a:pPr>
-              <a:t>‹nº›</a:t>
+              <a:t>‹#›</a:t>
             </a:fld>
             <a:endParaRPr lang="en-GB" sz="1400">
               <a:solidFill>
@@ -17904,7 +17904,7 @@
                   <a:tab pos="9144000" algn="l"/>
                 </a:tabLst>
               </a:pPr>
-              <a:t>‹nº›</a:t>
+              <a:t>‹#›</a:t>
             </a:fld>
             <a:endParaRPr lang="en-GB" sz="1400">
               <a:solidFill>
@@ -18115,7 +18115,7 @@
   <p:clrMapOvr>
     <a:masterClrMapping/>
   </p:clrMapOvr>
-  <p:transition/>
+  <p:transition xmlns:p14="http://schemas.microsoft.com/office/powerpoint/2010/main"/>
 </p:sldLayout>
 </file>
 
@@ -18234,7 +18234,7 @@
                   <a:tab pos="9144000" algn="l"/>
                 </a:tabLst>
               </a:pPr>
-              <a:t>‹nº›</a:t>
+              <a:t>‹#›</a:t>
             </a:fld>
             <a:endParaRPr lang="en-GB" sz="1400">
               <a:solidFill>
@@ -18563,7 +18563,7 @@
                   <a:tab pos="9144000" algn="l"/>
                 </a:tabLst>
               </a:pPr>
-              <a:t>‹nº›</a:t>
+              <a:t>‹#›</a:t>
             </a:fld>
             <a:endParaRPr lang="en-GB" sz="1400">
               <a:solidFill>
@@ -18944,7 +18944,7 @@
   <p:clrMapOvr>
     <a:masterClrMapping/>
   </p:clrMapOvr>
-  <p:transition/>
+  <p:transition xmlns:p14="http://schemas.microsoft.com/office/powerpoint/2010/main"/>
 </p:sldLayout>
 </file>
 
@@ -19063,7 +19063,7 @@
                   <a:tab pos="9144000" algn="l"/>
                 </a:tabLst>
               </a:pPr>
-              <a:t>‹nº›</a:t>
+              <a:t>‹#›</a:t>
             </a:fld>
             <a:endParaRPr lang="en-GB" sz="1400">
               <a:solidFill>
@@ -19359,7 +19359,7 @@
   <p:clrMapOvr>
     <a:masterClrMapping/>
   </p:clrMapOvr>
-  <p:transition/>
+  <p:transition xmlns:p14="http://schemas.microsoft.com/office/powerpoint/2010/main"/>
 </p:sldLayout>
 </file>
 
@@ -19478,7 +19478,7 @@
                   <a:tab pos="9144000" algn="l"/>
                 </a:tabLst>
               </a:pPr>
-              <a:t>‹nº›</a:t>
+              <a:t>‹#›</a:t>
             </a:fld>
             <a:endParaRPr lang="en-GB" sz="1400">
               <a:solidFill>
@@ -19774,7 +19774,7 @@
   <p:clrMapOvr>
     <a:masterClrMapping/>
   </p:clrMapOvr>
-  <p:transition/>
+  <p:transition xmlns:p14="http://schemas.microsoft.com/office/powerpoint/2010/main"/>
 </p:sldLayout>
 </file>
 
@@ -19893,7 +19893,7 @@
                   <a:tab pos="9144000" algn="l"/>
                 </a:tabLst>
               </a:pPr>
-              <a:t>‹nº›</a:t>
+              <a:t>‹#›</a:t>
             </a:fld>
             <a:endParaRPr lang="en-GB" sz="1400">
               <a:solidFill>
@@ -20189,7 +20189,7 @@
   <p:clrMapOvr>
     <a:masterClrMapping/>
   </p:clrMapOvr>
-  <p:transition/>
+  <p:transition xmlns:p14="http://schemas.microsoft.com/office/powerpoint/2010/main"/>
 </p:sldLayout>
 </file>
 
@@ -20308,7 +20308,7 @@
                   <a:tab pos="9144000" algn="l"/>
                 </a:tabLst>
               </a:pPr>
-              <a:t>‹nº›</a:t>
+              <a:t>‹#›</a:t>
             </a:fld>
             <a:endParaRPr lang="en-GB" sz="1400">
               <a:solidFill>
@@ -20604,7 +20604,7 @@
   <p:clrMapOvr>
     <a:masterClrMapping/>
   </p:clrMapOvr>
-  <p:transition/>
+  <p:transition xmlns:p14="http://schemas.microsoft.com/office/powerpoint/2010/main"/>
 </p:sldLayout>
 </file>
 
@@ -20723,7 +20723,7 @@
                   <a:tab pos="9144000" algn="l"/>
                 </a:tabLst>
               </a:pPr>
-              <a:t>‹nº›</a:t>
+              <a:t>‹#›</a:t>
             </a:fld>
             <a:endParaRPr lang="en-GB" sz="1400">
               <a:solidFill>
@@ -21191,7 +21191,7 @@
                   <a:tab pos="9144000" algn="l"/>
                 </a:tabLst>
               </a:pPr>
-              <a:t>‹nº›</a:t>
+              <a:t>‹#›</a:t>
             </a:fld>
             <a:endParaRPr lang="en-GB" sz="1400">
               <a:solidFill>
@@ -21350,7 +21350,7 @@
                   <a:tab pos="9144000" algn="l"/>
                 </a:tabLst>
               </a:pPr>
-              <a:t>‹nº›</a:t>
+              <a:t>‹#›</a:t>
             </a:fld>
             <a:endParaRPr lang="en-GB" sz="1400">
               <a:solidFill>
@@ -21486,7 +21486,7 @@
                   <a:tab pos="9144000" algn="l"/>
                 </a:tabLst>
               </a:pPr>
-              <a:t>‹nº›</a:t>
+              <a:t>‹#›</a:t>
             </a:fld>
             <a:endParaRPr lang="en-GB" sz="1400">
               <a:solidFill>
@@ -21804,7 +21804,7 @@
                   <a:tab pos="9144000" algn="l"/>
                 </a:tabLst>
               </a:pPr>
-              <a:t>‹nº›</a:t>
+              <a:t>‹#›</a:t>
             </a:fld>
             <a:endParaRPr lang="en-GB" sz="1400">
               <a:solidFill>
@@ -22099,7 +22099,7 @@
                   <a:tab pos="9144000" algn="l"/>
                 </a:tabLst>
               </a:pPr>
-              <a:t>‹nº›</a:t>
+              <a:t>‹#›</a:t>
             </a:fld>
             <a:endParaRPr lang="en-GB" sz="1400">
               <a:solidFill>
@@ -22310,7 +22310,7 @@
   <p:clrMapOvr>
     <a:masterClrMapping/>
   </p:clrMapOvr>
-  <p:transition/>
+  <p:transition xmlns:p14="http://schemas.microsoft.com/office/powerpoint/2010/main"/>
 </p:sldLayout>
 </file>
 
@@ -22429,7 +22429,7 @@
                   <a:tab pos="9144000" algn="l"/>
                 </a:tabLst>
               </a:pPr>
-              <a:t>‹nº›</a:t>
+              <a:t>‹#›</a:t>
             </a:fld>
             <a:endParaRPr lang="en-GB" sz="1400">
               <a:solidFill>
@@ -22640,7 +22640,7 @@
                   <a:tab pos="9144000" algn="l"/>
                 </a:tabLst>
               </a:pPr>
-              <a:t>‹nº›</a:t>
+              <a:t>‹#›</a:t>
             </a:fld>
             <a:endParaRPr lang="en-GB" sz="1400">
               <a:solidFill>
@@ -22861,7 +22861,7 @@
                   <a:tab pos="9144000" algn="l"/>
                 </a:tabLst>
               </a:pPr>
-              <a:t>‹nº›</a:t>
+              <a:t>‹#›</a:t>
             </a:fld>
             <a:endParaRPr lang="en-GB" sz="1400">
               <a:solidFill>
@@ -23242,7 +23242,7 @@
   <p:clrMapOvr>
     <a:masterClrMapping/>
   </p:clrMapOvr>
-  <p:transition/>
+  <p:transition xmlns:p14="http://schemas.microsoft.com/office/powerpoint/2010/main"/>
 </p:sldLayout>
 </file>
 
@@ -23361,7 +23361,7 @@
                   <a:tab pos="9144000" algn="l"/>
                 </a:tabLst>
               </a:pPr>
-              <a:t>‹nº›</a:t>
+              <a:t>‹#›</a:t>
             </a:fld>
             <a:endParaRPr lang="en-GB" sz="1400">
               <a:solidFill>
@@ -23657,7 +23657,7 @@
   <p:clrMapOvr>
     <a:masterClrMapping/>
   </p:clrMapOvr>
-  <p:transition/>
+  <p:transition xmlns:p14="http://schemas.microsoft.com/office/powerpoint/2010/main"/>
 </p:sldLayout>
 </file>
 
@@ -23776,7 +23776,7 @@
                   <a:tab pos="9144000" algn="l"/>
                 </a:tabLst>
               </a:pPr>
-              <a:t>‹nº›</a:t>
+              <a:t>‹#›</a:t>
             </a:fld>
             <a:endParaRPr lang="en-GB" sz="1400">
               <a:solidFill>
@@ -24072,7 +24072,7 @@
   <p:clrMapOvr>
     <a:masterClrMapping/>
   </p:clrMapOvr>
-  <p:transition/>
+  <p:transition xmlns:p14="http://schemas.microsoft.com/office/powerpoint/2010/main"/>
 </p:sldLayout>
 </file>
 
@@ -24191,7 +24191,7 @@
                   <a:tab pos="9144000" algn="l"/>
                 </a:tabLst>
               </a:pPr>
-              <a:t>‹nº›</a:t>
+              <a:t>‹#›</a:t>
             </a:fld>
             <a:endParaRPr lang="en-GB" sz="1400">
               <a:solidFill>
@@ -24487,7 +24487,7 @@
   <p:clrMapOvr>
     <a:masterClrMapping/>
   </p:clrMapOvr>
-  <p:transition/>
+  <p:transition xmlns:p14="http://schemas.microsoft.com/office/powerpoint/2010/main"/>
 </p:sldLayout>
 </file>
 
@@ -25582,7 +25582,7 @@
                   <a:tab pos="9144000" algn="l"/>
                 </a:tabLst>
               </a:pPr>
-              <a:t>‹nº›</a:t>
+              <a:t>‹#›</a:t>
             </a:fld>
             <a:endParaRPr lang="en-GB" sz="1400">
               <a:solidFill>
@@ -27202,13 +27202,13 @@
   <p:clrMapOvr>
     <a:masterClrMapping/>
   </p:clrMapOvr>
-  <p:transition spd="med">
+  <p:transition xmlns:p14="http://schemas.microsoft.com/office/powerpoint/2010/main" spd="med">
     <p:wipe dir="r"/>
   </p:transition>
   <p:timing>
     <p:tnLst>
       <p:par>
-        <p:cTn id="1" dur="indefinite" restart="never" nodeType="tmRoot">
+        <p:cTn xmlns:p14="http://schemas.microsoft.com/office/powerpoint/2010/main" id="1" dur="indefinite" restart="never" nodeType="tmRoot">
           <p:childTnLst>
             <p:seq concurrent="1" nextAc="seek">
               <p:cTn id="2" dur="indefinite" nodeType="mainSeq"/>
@@ -27433,14 +27433,14 @@
           </a:ln>
           <a:effectLst/>
           <a:extLst>
-            <a:ext uri="{909E8E84-426E-40DD-AFC4-6F175D3DCCD1}">
+            <a:ext uri="{909E8E84-426E-40dd-AFC4-6F175D3DCCD1}">
               <a14:hiddenFill xmlns:a14="http://schemas.microsoft.com/office/drawing/2010/main">
                 <a:solidFill>
                   <a:schemeClr val="accent1"/>
                 </a:solidFill>
               </a14:hiddenFill>
             </a:ext>
-            <a:ext uri="{91240B29-F687-4F45-9708-019B960494DF}">
+            <a:ext uri="{91240B29-F687-4f45-9708-019B960494DF}">
               <a14:hiddenLine xmlns:a14="http://schemas.microsoft.com/office/drawing/2010/main" w="9525">
                 <a:solidFill>
                   <a:schemeClr val="tx1"/>
@@ -27450,7 +27450,7 @@
                 <a:tailEnd/>
               </a14:hiddenLine>
             </a:ext>
-            <a:ext uri="{AF507438-7753-43E0-B8FC-AC1667EBCBE1}">
+            <a:ext uri="{AF507438-7753-43e0-B8FC-AC1667EBCBE1}">
               <a14:hiddenEffects xmlns:a14="http://schemas.microsoft.com/office/drawing/2010/main">
                 <a:effectLst>
                   <a:outerShdw dist="35921" dir="2700000" algn="ctr" rotWithShape="0">
@@ -27472,13 +27472,13 @@
   <p:clrMapOvr>
     <a:masterClrMapping/>
   </p:clrMapOvr>
-  <p:transition spd="med">
+  <p:transition xmlns:p14="http://schemas.microsoft.com/office/powerpoint/2010/main" spd="med">
     <p:wipe dir="r"/>
   </p:transition>
   <p:timing>
     <p:tnLst>
       <p:par>
-        <p:cTn id="1" dur="indefinite" restart="never" nodeType="tmRoot">
+        <p:cTn xmlns:p14="http://schemas.microsoft.com/office/powerpoint/2010/main" id="1" dur="indefinite" restart="never" nodeType="tmRoot">
           <p:childTnLst>
             <p:seq concurrent="1" nextAc="seek">
               <p:cTn id="2" dur="indefinite" nodeType="mainSeq"/>
@@ -28132,13 +28132,13 @@
   <p:clrMapOvr>
     <a:masterClrMapping/>
   </p:clrMapOvr>
-  <p:transition spd="med">
+  <p:transition xmlns:p14="http://schemas.microsoft.com/office/powerpoint/2010/main" spd="med">
     <p:wipe dir="r"/>
   </p:transition>
   <p:timing>
     <p:tnLst>
       <p:par>
-        <p:cTn id="1" dur="indefinite" restart="never" nodeType="tmRoot">
+        <p:cTn xmlns:p14="http://schemas.microsoft.com/office/powerpoint/2010/main" id="1" dur="indefinite" restart="never" nodeType="tmRoot">
           <p:childTnLst>
             <p:seq concurrent="1" nextAc="seek">
               <p:cTn id="2" dur="indefinite" nodeType="mainSeq"/>
@@ -28697,14 +28697,14 @@
           </a:ln>
           <a:effectLst/>
           <a:extLst>
-            <a:ext uri="{909E8E84-426E-40DD-AFC4-6F175D3DCCD1}">
+            <a:ext uri="{909E8E84-426E-40dd-AFC4-6F175D3DCCD1}">
               <a14:hiddenFill xmlns:a14="http://schemas.microsoft.com/office/drawing/2010/main">
                 <a:solidFill>
                   <a:schemeClr val="accent1"/>
                 </a:solidFill>
               </a14:hiddenFill>
             </a:ext>
-            <a:ext uri="{91240B29-F687-4F45-9708-019B960494DF}">
+            <a:ext uri="{91240B29-F687-4f45-9708-019B960494DF}">
               <a14:hiddenLine xmlns:a14="http://schemas.microsoft.com/office/drawing/2010/main" w="9525">
                 <a:solidFill>
                   <a:schemeClr val="tx1"/>
@@ -28714,7 +28714,7 @@
                 <a:tailEnd/>
               </a14:hiddenLine>
             </a:ext>
-            <a:ext uri="{AF507438-7753-43E0-B8FC-AC1667EBCBE1}">
+            <a:ext uri="{AF507438-7753-43e0-B8FC-AC1667EBCBE1}">
               <a14:hiddenEffects xmlns:a14="http://schemas.microsoft.com/office/drawing/2010/main">
                 <a:effectLst>
                   <a:outerShdw dist="35921" dir="2700000" algn="ctr" rotWithShape="0">
@@ -28761,14 +28761,14 @@
           </a:ln>
           <a:effectLst/>
           <a:extLst>
-            <a:ext uri="{909E8E84-426E-40DD-AFC4-6F175D3DCCD1}">
+            <a:ext uri="{909E8E84-426E-40dd-AFC4-6F175D3DCCD1}">
               <a14:hiddenFill xmlns:a14="http://schemas.microsoft.com/office/drawing/2010/main">
                 <a:solidFill>
                   <a:schemeClr val="accent1"/>
                 </a:solidFill>
               </a14:hiddenFill>
             </a:ext>
-            <a:ext uri="{91240B29-F687-4F45-9708-019B960494DF}">
+            <a:ext uri="{91240B29-F687-4f45-9708-019B960494DF}">
               <a14:hiddenLine xmlns:a14="http://schemas.microsoft.com/office/drawing/2010/main" w="9525">
                 <a:solidFill>
                   <a:schemeClr val="tx1"/>
@@ -28778,7 +28778,7 @@
                 <a:tailEnd/>
               </a14:hiddenLine>
             </a:ext>
-            <a:ext uri="{AF507438-7753-43E0-B8FC-AC1667EBCBE1}">
+            <a:ext uri="{AF507438-7753-43e0-B8FC-AC1667EBCBE1}">
               <a14:hiddenEffects xmlns:a14="http://schemas.microsoft.com/office/drawing/2010/main">
                 <a:effectLst>
                   <a:outerShdw dist="35921" dir="2700000" algn="ctr" rotWithShape="0">
@@ -28800,13 +28800,13 @@
   <p:clrMapOvr>
     <a:masterClrMapping/>
   </p:clrMapOvr>
-  <p:transition spd="med">
+  <p:transition xmlns:p14="http://schemas.microsoft.com/office/powerpoint/2010/main" spd="med">
     <p:wipe dir="r"/>
   </p:transition>
   <p:timing>
     <p:tnLst>
       <p:par>
-        <p:cTn id="1" dur="indefinite" restart="never" nodeType="tmRoot">
+        <p:cTn xmlns:p14="http://schemas.microsoft.com/office/powerpoint/2010/main" id="1" dur="indefinite" restart="never" nodeType="tmRoot">
           <p:childTnLst>
             <p:seq concurrent="1" nextAc="seek">
               <p:cTn id="2" dur="indefinite" nodeType="mainSeq"/>
@@ -29042,14 +29042,14 @@
           </a:ln>
           <a:effectLst/>
           <a:extLst>
-            <a:ext uri="{909E8E84-426E-40DD-AFC4-6F175D3DCCD1}">
+            <a:ext uri="{909E8E84-426E-40dd-AFC4-6F175D3DCCD1}">
               <a14:hiddenFill xmlns:a14="http://schemas.microsoft.com/office/drawing/2010/main">
                 <a:solidFill>
                   <a:schemeClr val="accent1"/>
                 </a:solidFill>
               </a14:hiddenFill>
             </a:ext>
-            <a:ext uri="{91240B29-F687-4F45-9708-019B960494DF}">
+            <a:ext uri="{91240B29-F687-4f45-9708-019B960494DF}">
               <a14:hiddenLine xmlns:a14="http://schemas.microsoft.com/office/drawing/2010/main" w="9525">
                 <a:solidFill>
                   <a:schemeClr val="tx1"/>
@@ -29059,7 +29059,7 @@
                 <a:tailEnd/>
               </a14:hiddenLine>
             </a:ext>
-            <a:ext uri="{AF507438-7753-43E0-B8FC-AC1667EBCBE1}">
+            <a:ext uri="{AF507438-7753-43e0-B8FC-AC1667EBCBE1}">
               <a14:hiddenEffects xmlns:a14="http://schemas.microsoft.com/office/drawing/2010/main">
                 <a:effectLst>
                   <a:outerShdw dist="35921" dir="2700000" algn="ctr" rotWithShape="0">
@@ -29081,13 +29081,13 @@
   <p:clrMapOvr>
     <a:masterClrMapping/>
   </p:clrMapOvr>
-  <p:transition spd="med">
+  <p:transition xmlns:p14="http://schemas.microsoft.com/office/powerpoint/2010/main" spd="med">
     <p:wipe dir="r"/>
   </p:transition>
   <p:timing>
     <p:tnLst>
       <p:par>
-        <p:cTn id="1" dur="indefinite" restart="never" nodeType="tmRoot">
+        <p:cTn xmlns:p14="http://schemas.microsoft.com/office/powerpoint/2010/main" id="1" dur="indefinite" restart="never" nodeType="tmRoot">
           <p:childTnLst>
             <p:seq concurrent="1" nextAc="seek">
               <p:cTn id="2" dur="indefinite" nodeType="mainSeq"/>
@@ -29323,14 +29323,14 @@
           </a:ln>
           <a:effectLst/>
           <a:extLst>
-            <a:ext uri="{909E8E84-426E-40DD-AFC4-6F175D3DCCD1}">
+            <a:ext uri="{909E8E84-426E-40dd-AFC4-6F175D3DCCD1}">
               <a14:hiddenFill xmlns:a14="http://schemas.microsoft.com/office/drawing/2010/main">
                 <a:solidFill>
                   <a:schemeClr val="accent1"/>
                 </a:solidFill>
               </a14:hiddenFill>
             </a:ext>
-            <a:ext uri="{91240B29-F687-4F45-9708-019B960494DF}">
+            <a:ext uri="{91240B29-F687-4f45-9708-019B960494DF}">
               <a14:hiddenLine xmlns:a14="http://schemas.microsoft.com/office/drawing/2010/main" w="9525">
                 <a:solidFill>
                   <a:schemeClr val="tx1"/>
@@ -29340,7 +29340,7 @@
                 <a:tailEnd/>
               </a14:hiddenLine>
             </a:ext>
-            <a:ext uri="{AF507438-7753-43E0-B8FC-AC1667EBCBE1}">
+            <a:ext uri="{AF507438-7753-43e0-B8FC-AC1667EBCBE1}">
               <a14:hiddenEffects xmlns:a14="http://schemas.microsoft.com/office/drawing/2010/main">
                 <a:effectLst>
                   <a:outerShdw dist="35921" dir="2700000" algn="ctr" rotWithShape="0">
@@ -29362,13 +29362,13 @@
   <p:clrMapOvr>
     <a:masterClrMapping/>
   </p:clrMapOvr>
-  <p:transition spd="med">
+  <p:transition xmlns:p14="http://schemas.microsoft.com/office/powerpoint/2010/main" spd="med">
     <p:wipe dir="r"/>
   </p:transition>
   <p:timing>
     <p:tnLst>
       <p:par>
-        <p:cTn id="1" dur="indefinite" restart="never" nodeType="tmRoot">
+        <p:cTn xmlns:p14="http://schemas.microsoft.com/office/powerpoint/2010/main" id="1" dur="indefinite" restart="never" nodeType="tmRoot">
           <p:childTnLst>
             <p:seq concurrent="1" nextAc="seek">
               <p:cTn id="2" dur="indefinite" nodeType="mainSeq"/>
@@ -30024,14 +30024,14 @@
           </a:ln>
           <a:effectLst/>
           <a:extLst>
-            <a:ext uri="{909E8E84-426E-40DD-AFC4-6F175D3DCCD1}">
+            <a:ext uri="{909E8E84-426E-40dd-AFC4-6F175D3DCCD1}">
               <a14:hiddenFill xmlns:a14="http://schemas.microsoft.com/office/drawing/2010/main">
                 <a:solidFill>
                   <a:schemeClr val="accent1"/>
                 </a:solidFill>
               </a14:hiddenFill>
             </a:ext>
-            <a:ext uri="{AF507438-7753-43E0-B8FC-AC1667EBCBE1}">
+            <a:ext uri="{AF507438-7753-43e0-B8FC-AC1667EBCBE1}">
               <a14:hiddenEffects xmlns:a14="http://schemas.microsoft.com/office/drawing/2010/main">
                 <a:effectLst>
                   <a:outerShdw dist="35921" dir="2700000" algn="ctr" rotWithShape="0">
@@ -30078,14 +30078,14 @@
           </a:ln>
           <a:effectLst/>
           <a:extLst>
-            <a:ext uri="{909E8E84-426E-40DD-AFC4-6F175D3DCCD1}">
+            <a:ext uri="{909E8E84-426E-40dd-AFC4-6F175D3DCCD1}">
               <a14:hiddenFill xmlns:a14="http://schemas.microsoft.com/office/drawing/2010/main">
                 <a:solidFill>
                   <a:schemeClr val="accent1"/>
                 </a:solidFill>
               </a14:hiddenFill>
             </a:ext>
-            <a:ext uri="{91240B29-F687-4F45-9708-019B960494DF}">
+            <a:ext uri="{91240B29-F687-4f45-9708-019B960494DF}">
               <a14:hiddenLine xmlns:a14="http://schemas.microsoft.com/office/drawing/2010/main" w="9525">
                 <a:solidFill>
                   <a:schemeClr val="tx1"/>
@@ -30095,7 +30095,7 @@
                 <a:tailEnd/>
               </a14:hiddenLine>
             </a:ext>
-            <a:ext uri="{AF507438-7753-43E0-B8FC-AC1667EBCBE1}">
+            <a:ext uri="{AF507438-7753-43e0-B8FC-AC1667EBCBE1}">
               <a14:hiddenEffects xmlns:a14="http://schemas.microsoft.com/office/drawing/2010/main">
                 <a:effectLst>
                   <a:outerShdw dist="35921" dir="2700000" algn="ctr" rotWithShape="0">
@@ -30142,14 +30142,14 @@
           </a:ln>
           <a:effectLst/>
           <a:extLst>
-            <a:ext uri="{909E8E84-426E-40DD-AFC4-6F175D3DCCD1}">
+            <a:ext uri="{909E8E84-426E-40dd-AFC4-6F175D3DCCD1}">
               <a14:hiddenFill xmlns:a14="http://schemas.microsoft.com/office/drawing/2010/main">
                 <a:solidFill>
                   <a:schemeClr val="accent1"/>
                 </a:solidFill>
               </a14:hiddenFill>
             </a:ext>
-            <a:ext uri="{91240B29-F687-4F45-9708-019B960494DF}">
+            <a:ext uri="{91240B29-F687-4f45-9708-019B960494DF}">
               <a14:hiddenLine xmlns:a14="http://schemas.microsoft.com/office/drawing/2010/main" w="9525">
                 <a:solidFill>
                   <a:schemeClr val="tx1"/>
@@ -30159,7 +30159,7 @@
                 <a:tailEnd/>
               </a14:hiddenLine>
             </a:ext>
-            <a:ext uri="{AF507438-7753-43E0-B8FC-AC1667EBCBE1}">
+            <a:ext uri="{AF507438-7753-43e0-B8FC-AC1667EBCBE1}">
               <a14:hiddenEffects xmlns:a14="http://schemas.microsoft.com/office/drawing/2010/main">
                 <a:effectLst>
                   <a:outerShdw dist="35921" dir="2700000" algn="ctr" rotWithShape="0">
@@ -30176,13 +30176,13 @@
   <p:clrMapOvr>
     <a:masterClrMapping/>
   </p:clrMapOvr>
-  <p:transition spd="med">
+  <p:transition xmlns:p14="http://schemas.microsoft.com/office/powerpoint/2010/main" spd="med">
     <p:wipe dir="r"/>
   </p:transition>
   <p:timing>
     <p:tnLst>
       <p:par>
-        <p:cTn id="1" dur="indefinite" restart="never" nodeType="tmRoot">
+        <p:cTn xmlns:p14="http://schemas.microsoft.com/office/powerpoint/2010/main" id="1" dur="indefinite" restart="never" nodeType="tmRoot">
           <p:childTnLst>
             <p:seq concurrent="1" nextAc="seek">
               <p:cTn id="2" dur="indefinite" nodeType="mainSeq"/>
@@ -30334,14 +30334,14 @@
           </a:ln>
           <a:effectLst/>
           <a:extLst>
-            <a:ext uri="{909E8E84-426E-40DD-AFC4-6F175D3DCCD1}">
+            <a:ext uri="{909E8E84-426E-40dd-AFC4-6F175D3DCCD1}">
               <a14:hiddenFill xmlns:a14="http://schemas.microsoft.com/office/drawing/2010/main">
                 <a:solidFill>
                   <a:schemeClr val="accent1"/>
                 </a:solidFill>
               </a14:hiddenFill>
             </a:ext>
-            <a:ext uri="{91240B29-F687-4F45-9708-019B960494DF}">
+            <a:ext uri="{91240B29-F687-4f45-9708-019B960494DF}">
               <a14:hiddenLine xmlns:a14="http://schemas.microsoft.com/office/drawing/2010/main" w="9525">
                 <a:solidFill>
                   <a:schemeClr val="tx1"/>
@@ -30351,7 +30351,7 @@
                 <a:tailEnd/>
               </a14:hiddenLine>
             </a:ext>
-            <a:ext uri="{AF507438-7753-43E0-B8FC-AC1667EBCBE1}">
+            <a:ext uri="{AF507438-7753-43e0-B8FC-AC1667EBCBE1}">
               <a14:hiddenEffects xmlns:a14="http://schemas.microsoft.com/office/drawing/2010/main">
                 <a:effectLst>
                   <a:outerShdw dist="35921" dir="2700000" algn="ctr" rotWithShape="0">
@@ -30398,14 +30398,14 @@
           </a:ln>
           <a:effectLst/>
           <a:extLst>
-            <a:ext uri="{909E8E84-426E-40DD-AFC4-6F175D3DCCD1}">
+            <a:ext uri="{909E8E84-426E-40dd-AFC4-6F175D3DCCD1}">
               <a14:hiddenFill xmlns:a14="http://schemas.microsoft.com/office/drawing/2010/main">
                 <a:solidFill>
                   <a:schemeClr val="accent1"/>
                 </a:solidFill>
               </a14:hiddenFill>
             </a:ext>
-            <a:ext uri="{91240B29-F687-4F45-9708-019B960494DF}">
+            <a:ext uri="{91240B29-F687-4f45-9708-019B960494DF}">
               <a14:hiddenLine xmlns:a14="http://schemas.microsoft.com/office/drawing/2010/main" w="9525">
                 <a:solidFill>
                   <a:schemeClr val="tx1"/>
@@ -30415,7 +30415,7 @@
                 <a:tailEnd/>
               </a14:hiddenLine>
             </a:ext>
-            <a:ext uri="{AF507438-7753-43E0-B8FC-AC1667EBCBE1}">
+            <a:ext uri="{AF507438-7753-43e0-B8FC-AC1667EBCBE1}">
               <a14:hiddenEffects xmlns:a14="http://schemas.microsoft.com/office/drawing/2010/main">
                 <a:effectLst>
                   <a:outerShdw dist="35921" dir="2700000" algn="ctr" rotWithShape="0">
@@ -30432,13 +30432,13 @@
   <p:clrMapOvr>
     <a:masterClrMapping/>
   </p:clrMapOvr>
-  <p:transition spd="med">
+  <p:transition xmlns:p14="http://schemas.microsoft.com/office/powerpoint/2010/main" spd="med">
     <p:wipe dir="r"/>
   </p:transition>
   <p:timing>
     <p:tnLst>
       <p:par>
-        <p:cTn id="1" dur="indefinite" restart="never" nodeType="tmRoot">
+        <p:cTn xmlns:p14="http://schemas.microsoft.com/office/powerpoint/2010/main" id="1" dur="indefinite" restart="never" nodeType="tmRoot">
           <p:childTnLst>
             <p:seq concurrent="1" nextAc="seek">
               <p:cTn id="2" dur="indefinite" nodeType="mainSeq"/>
@@ -30670,13 +30670,13 @@
   <p:clrMapOvr>
     <a:masterClrMapping/>
   </p:clrMapOvr>
-  <p:transition spd="med">
+  <p:transition xmlns:p14="http://schemas.microsoft.com/office/powerpoint/2010/main" spd="med">
     <p:wipe dir="r"/>
   </p:transition>
   <p:timing>
     <p:tnLst>
       <p:par>
-        <p:cTn id="1" dur="indefinite" restart="never" nodeType="tmRoot">
+        <p:cTn xmlns:p14="http://schemas.microsoft.com/office/powerpoint/2010/main" id="1" dur="indefinite" restart="never" nodeType="tmRoot">
           <p:childTnLst>
             <p:seq concurrent="1" nextAc="seek">
               <p:cTn id="2" dur="indefinite" nodeType="mainSeq"/>
@@ -31512,14 +31512,14 @@
           </a:ln>
           <a:effectLst/>
           <a:extLst>
-            <a:ext uri="{909E8E84-426E-40DD-AFC4-6F175D3DCCD1}">
+            <a:ext uri="{909E8E84-426E-40dd-AFC4-6F175D3DCCD1}">
               <a14:hiddenFill xmlns:a14="http://schemas.microsoft.com/office/drawing/2010/main">
                 <a:solidFill>
                   <a:schemeClr val="accent1"/>
                 </a:solidFill>
               </a14:hiddenFill>
             </a:ext>
-            <a:ext uri="{91240B29-F687-4F45-9708-019B960494DF}">
+            <a:ext uri="{91240B29-F687-4f45-9708-019B960494DF}">
               <a14:hiddenLine xmlns:a14="http://schemas.microsoft.com/office/drawing/2010/main" w="9525">
                 <a:solidFill>
                   <a:schemeClr val="tx1"/>
@@ -31529,7 +31529,7 @@
                 <a:tailEnd/>
               </a14:hiddenLine>
             </a:ext>
-            <a:ext uri="{AF507438-7753-43E0-B8FC-AC1667EBCBE1}">
+            <a:ext uri="{AF507438-7753-43e0-B8FC-AC1667EBCBE1}">
               <a14:hiddenEffects xmlns:a14="http://schemas.microsoft.com/office/drawing/2010/main">
                 <a:effectLst>
                   <a:outerShdw dist="35921" dir="2700000" algn="ctr" rotWithShape="0">
@@ -31576,14 +31576,14 @@
           </a:ln>
           <a:effectLst/>
           <a:extLst>
-            <a:ext uri="{909E8E84-426E-40DD-AFC4-6F175D3DCCD1}">
+            <a:ext uri="{909E8E84-426E-40dd-AFC4-6F175D3DCCD1}">
               <a14:hiddenFill xmlns:a14="http://schemas.microsoft.com/office/drawing/2010/main">
                 <a:solidFill>
                   <a:schemeClr val="accent1"/>
                 </a:solidFill>
               </a14:hiddenFill>
             </a:ext>
-            <a:ext uri="{91240B29-F687-4F45-9708-019B960494DF}">
+            <a:ext uri="{91240B29-F687-4f45-9708-019B960494DF}">
               <a14:hiddenLine xmlns:a14="http://schemas.microsoft.com/office/drawing/2010/main" w="9525">
                 <a:solidFill>
                   <a:schemeClr val="tx1"/>
@@ -31593,7 +31593,7 @@
                 <a:tailEnd/>
               </a14:hiddenLine>
             </a:ext>
-            <a:ext uri="{AF507438-7753-43E0-B8FC-AC1667EBCBE1}">
+            <a:ext uri="{AF507438-7753-43e0-B8FC-AC1667EBCBE1}">
               <a14:hiddenEffects xmlns:a14="http://schemas.microsoft.com/office/drawing/2010/main">
                 <a:effectLst>
                   <a:outerShdw dist="35921" dir="2700000" algn="ctr" rotWithShape="0">
@@ -31610,13 +31610,13 @@
   <p:clrMapOvr>
     <a:masterClrMapping/>
   </p:clrMapOvr>
-  <p:transition spd="med">
+  <p:transition xmlns:p14="http://schemas.microsoft.com/office/powerpoint/2010/main" spd="med">
     <p:wipe dir="r"/>
   </p:transition>
   <p:timing>
     <p:tnLst>
       <p:par>
-        <p:cTn id="1" dur="indefinite" restart="never" nodeType="tmRoot">
+        <p:cTn xmlns:p14="http://schemas.microsoft.com/office/powerpoint/2010/main" id="1" dur="indefinite" restart="never" nodeType="tmRoot">
           <p:childTnLst>
             <p:seq concurrent="1" nextAc="seek">
               <p:cTn id="2" dur="indefinite" nodeType="mainSeq"/>
@@ -31910,14 +31910,14 @@
           </a:ln>
           <a:effectLst/>
           <a:extLst>
-            <a:ext uri="{909E8E84-426E-40DD-AFC4-6F175D3DCCD1}">
+            <a:ext uri="{909E8E84-426E-40dd-AFC4-6F175D3DCCD1}">
               <a14:hiddenFill xmlns:a14="http://schemas.microsoft.com/office/drawing/2010/main">
                 <a:solidFill>
                   <a:schemeClr val="accent1"/>
                 </a:solidFill>
               </a14:hiddenFill>
             </a:ext>
-            <a:ext uri="{91240B29-F687-4F45-9708-019B960494DF}">
+            <a:ext uri="{91240B29-F687-4f45-9708-019B960494DF}">
               <a14:hiddenLine xmlns:a14="http://schemas.microsoft.com/office/drawing/2010/main" w="9525">
                 <a:solidFill>
                   <a:schemeClr val="tx1"/>
@@ -31927,7 +31927,7 @@
                 <a:tailEnd/>
               </a14:hiddenLine>
             </a:ext>
-            <a:ext uri="{AF507438-7753-43E0-B8FC-AC1667EBCBE1}">
+            <a:ext uri="{AF507438-7753-43e0-B8FC-AC1667EBCBE1}">
               <a14:hiddenEffects xmlns:a14="http://schemas.microsoft.com/office/drawing/2010/main">
                 <a:effectLst>
                   <a:outerShdw dist="35921" dir="2700000" algn="ctr" rotWithShape="0">
@@ -31944,13 +31944,13 @@
   <p:clrMapOvr>
     <a:masterClrMapping/>
   </p:clrMapOvr>
-  <p:transition spd="med">
+  <p:transition xmlns:p14="http://schemas.microsoft.com/office/powerpoint/2010/main" spd="med">
     <p:wipe dir="r"/>
   </p:transition>
   <p:timing>
     <p:tnLst>
       <p:par>
-        <p:cTn id="1" dur="indefinite" restart="never" nodeType="tmRoot">
+        <p:cTn xmlns:p14="http://schemas.microsoft.com/office/powerpoint/2010/main" id="1" dur="indefinite" restart="never" nodeType="tmRoot">
           <p:childTnLst>
             <p:seq concurrent="1" nextAc="seek">
               <p:cTn id="2" dur="indefinite" nodeType="mainSeq"/>
@@ -32182,13 +32182,13 @@
   <p:clrMapOvr>
     <a:masterClrMapping/>
   </p:clrMapOvr>
-  <p:transition spd="med">
+  <p:transition xmlns:p14="http://schemas.microsoft.com/office/powerpoint/2010/main" spd="med">
     <p:wipe dir="r"/>
   </p:transition>
   <p:timing>
     <p:tnLst>
       <p:par>
-        <p:cTn id="1" dur="indefinite" restart="never" nodeType="tmRoot">
+        <p:cTn xmlns:p14="http://schemas.microsoft.com/office/powerpoint/2010/main" id="1" dur="indefinite" restart="never" nodeType="tmRoot">
           <p:childTnLst>
             <p:seq concurrent="1" nextAc="seek">
               <p:cTn id="2" dur="indefinite" nodeType="mainSeq"/>
@@ -32587,14 +32587,14 @@
           </a:ln>
           <a:effectLst/>
           <a:extLst>
-            <a:ext uri="{909E8E84-426E-40DD-AFC4-6F175D3DCCD1}">
+            <a:ext uri="{909E8E84-426E-40dd-AFC4-6F175D3DCCD1}">
               <a14:hiddenFill xmlns:a14="http://schemas.microsoft.com/office/drawing/2010/main">
                 <a:solidFill>
                   <a:schemeClr val="accent1"/>
                 </a:solidFill>
               </a14:hiddenFill>
             </a:ext>
-            <a:ext uri="{91240B29-F687-4F45-9708-019B960494DF}">
+            <a:ext uri="{91240B29-F687-4f45-9708-019B960494DF}">
               <a14:hiddenLine xmlns:a14="http://schemas.microsoft.com/office/drawing/2010/main" w="9525">
                 <a:solidFill>
                   <a:schemeClr val="tx1"/>
@@ -32604,7 +32604,7 @@
                 <a:tailEnd/>
               </a14:hiddenLine>
             </a:ext>
-            <a:ext uri="{AF507438-7753-43E0-B8FC-AC1667EBCBE1}">
+            <a:ext uri="{AF507438-7753-43e0-B8FC-AC1667EBCBE1}">
               <a14:hiddenEffects xmlns:a14="http://schemas.microsoft.com/office/drawing/2010/main">
                 <a:effectLst>
                   <a:outerShdw dist="35921" dir="2700000" algn="ctr" rotWithShape="0">
@@ -32621,13 +32621,13 @@
   <p:clrMapOvr>
     <a:masterClrMapping/>
   </p:clrMapOvr>
-  <p:transition spd="med">
+  <p:transition xmlns:p14="http://schemas.microsoft.com/office/powerpoint/2010/main" spd="med">
     <p:wipe dir="r"/>
   </p:transition>
   <p:timing>
     <p:tnLst>
       <p:par>
-        <p:cTn id="1" dur="indefinite" restart="never" nodeType="tmRoot">
+        <p:cTn xmlns:p14="http://schemas.microsoft.com/office/powerpoint/2010/main" id="1" dur="indefinite" restart="never" nodeType="tmRoot">
           <p:childTnLst>
             <p:seq concurrent="1" nextAc="seek">
               <p:cTn id="2" dur="indefinite" nodeType="mainSeq"/>
@@ -32927,14 +32927,14 @@
           </a:ln>
           <a:effectLst/>
           <a:extLst>
-            <a:ext uri="{909E8E84-426E-40DD-AFC4-6F175D3DCCD1}">
+            <a:ext uri="{909E8E84-426E-40dd-AFC4-6F175D3DCCD1}">
               <a14:hiddenFill xmlns:a14="http://schemas.microsoft.com/office/drawing/2010/main">
                 <a:solidFill>
                   <a:schemeClr val="accent1"/>
                 </a:solidFill>
               </a14:hiddenFill>
             </a:ext>
-            <a:ext uri="{91240B29-F687-4F45-9708-019B960494DF}">
+            <a:ext uri="{91240B29-F687-4f45-9708-019B960494DF}">
               <a14:hiddenLine xmlns:a14="http://schemas.microsoft.com/office/drawing/2010/main" w="9525">
                 <a:solidFill>
                   <a:schemeClr val="tx1"/>
@@ -32944,7 +32944,7 @@
                 <a:tailEnd/>
               </a14:hiddenLine>
             </a:ext>
-            <a:ext uri="{AF507438-7753-43E0-B8FC-AC1667EBCBE1}">
+            <a:ext uri="{AF507438-7753-43e0-B8FC-AC1667EBCBE1}">
               <a14:hiddenEffects xmlns:a14="http://schemas.microsoft.com/office/drawing/2010/main">
                 <a:effectLst>
                   <a:outerShdw dist="35921" dir="2700000" algn="ctr" rotWithShape="0">
@@ -32961,13 +32961,13 @@
   <p:clrMapOvr>
     <a:masterClrMapping/>
   </p:clrMapOvr>
-  <p:transition spd="med">
+  <p:transition xmlns:p14="http://schemas.microsoft.com/office/powerpoint/2010/main" spd="med">
     <p:wipe dir="r"/>
   </p:transition>
   <p:timing>
     <p:tnLst>
       <p:par>
-        <p:cTn id="1" dur="indefinite" restart="never" nodeType="tmRoot">
+        <p:cTn xmlns:p14="http://schemas.microsoft.com/office/powerpoint/2010/main" id="1" dur="indefinite" restart="never" nodeType="tmRoot">
           <p:childTnLst>
             <p:seq concurrent="1" nextAc="seek">
               <p:cTn id="2" dur="indefinite" nodeType="mainSeq"/>
@@ -33392,14 +33392,14 @@
           </a:ln>
           <a:effectLst/>
           <a:extLst>
-            <a:ext uri="{909E8E84-426E-40DD-AFC4-6F175D3DCCD1}">
+            <a:ext uri="{909E8E84-426E-40dd-AFC4-6F175D3DCCD1}">
               <a14:hiddenFill xmlns:a14="http://schemas.microsoft.com/office/drawing/2010/main">
                 <a:solidFill>
                   <a:schemeClr val="accent1"/>
                 </a:solidFill>
               </a14:hiddenFill>
             </a:ext>
-            <a:ext uri="{91240B29-F687-4F45-9708-019B960494DF}">
+            <a:ext uri="{91240B29-F687-4f45-9708-019B960494DF}">
               <a14:hiddenLine xmlns:a14="http://schemas.microsoft.com/office/drawing/2010/main" w="9525">
                 <a:solidFill>
                   <a:schemeClr val="tx1"/>
@@ -33409,7 +33409,7 @@
                 <a:tailEnd/>
               </a14:hiddenLine>
             </a:ext>
-            <a:ext uri="{AF507438-7753-43E0-B8FC-AC1667EBCBE1}">
+            <a:ext uri="{AF507438-7753-43e0-B8FC-AC1667EBCBE1}">
               <a14:hiddenEffects xmlns:a14="http://schemas.microsoft.com/office/drawing/2010/main">
                 <a:effectLst>
                   <a:outerShdw dist="35921" dir="2700000" algn="ctr" rotWithShape="0">
@@ -33426,13 +33426,13 @@
   <p:clrMapOvr>
     <a:masterClrMapping/>
   </p:clrMapOvr>
-  <p:transition spd="med">
+  <p:transition xmlns:p14="http://schemas.microsoft.com/office/powerpoint/2010/main" spd="med">
     <p:wipe dir="r"/>
   </p:transition>
   <p:timing>
     <p:tnLst>
       <p:par>
-        <p:cTn id="1" dur="indefinite" restart="never" nodeType="tmRoot">
+        <p:cTn xmlns:p14="http://schemas.microsoft.com/office/powerpoint/2010/main" id="1" dur="indefinite" restart="never" nodeType="tmRoot">
           <p:childTnLst>
             <p:seq concurrent="1" nextAc="seek">
               <p:cTn id="2" dur="indefinite" nodeType="mainSeq"/>
@@ -33772,14 +33772,14 @@
           </a:ln>
           <a:effectLst/>
           <a:extLst>
-            <a:ext uri="{909E8E84-426E-40DD-AFC4-6F175D3DCCD1}">
+            <a:ext uri="{909E8E84-426E-40dd-AFC4-6F175D3DCCD1}">
               <a14:hiddenFill xmlns:a14="http://schemas.microsoft.com/office/drawing/2010/main">
                 <a:solidFill>
                   <a:schemeClr val="accent1"/>
                 </a:solidFill>
               </a14:hiddenFill>
             </a:ext>
-            <a:ext uri="{91240B29-F687-4F45-9708-019B960494DF}">
+            <a:ext uri="{91240B29-F687-4f45-9708-019B960494DF}">
               <a14:hiddenLine xmlns:a14="http://schemas.microsoft.com/office/drawing/2010/main" w="9525">
                 <a:solidFill>
                   <a:schemeClr val="tx1"/>
@@ -33789,7 +33789,7 @@
                 <a:tailEnd/>
               </a14:hiddenLine>
             </a:ext>
-            <a:ext uri="{AF507438-7753-43E0-B8FC-AC1667EBCBE1}">
+            <a:ext uri="{AF507438-7753-43e0-B8FC-AC1667EBCBE1}">
               <a14:hiddenEffects xmlns:a14="http://schemas.microsoft.com/office/drawing/2010/main">
                 <a:effectLst>
                   <a:outerShdw dist="35921" dir="2700000" algn="ctr" rotWithShape="0">
@@ -33806,13 +33806,13 @@
   <p:clrMapOvr>
     <a:masterClrMapping/>
   </p:clrMapOvr>
-  <p:transition spd="med">
+  <p:transition xmlns:p14="http://schemas.microsoft.com/office/powerpoint/2010/main" spd="med">
     <p:wipe dir="r"/>
   </p:transition>
   <p:timing>
     <p:tnLst>
       <p:par>
-        <p:cTn id="1" dur="indefinite" restart="never" nodeType="tmRoot">
+        <p:cTn xmlns:p14="http://schemas.microsoft.com/office/powerpoint/2010/main" id="1" dur="indefinite" restart="never" nodeType="tmRoot">
           <p:childTnLst>
             <p:seq concurrent="1" nextAc="seek">
               <p:cTn id="2" dur="indefinite" nodeType="mainSeq"/>
@@ -33891,14 +33891,14 @@
           </a:ln>
           <a:effectLst/>
           <a:extLst>
-            <a:ext uri="{909E8E84-426E-40DD-AFC4-6F175D3DCCD1}">
+            <a:ext uri="{909E8E84-426E-40dd-AFC4-6F175D3DCCD1}">
               <a14:hiddenFill xmlns:a14="http://schemas.microsoft.com/office/drawing/2010/main">
                 <a:solidFill>
                   <a:schemeClr val="accent1"/>
                 </a:solidFill>
               </a14:hiddenFill>
             </a:ext>
-            <a:ext uri="{91240B29-F687-4F45-9708-019B960494DF}">
+            <a:ext uri="{91240B29-F687-4f45-9708-019B960494DF}">
               <a14:hiddenLine xmlns:a14="http://schemas.microsoft.com/office/drawing/2010/main" w="9525">
                 <a:solidFill>
                   <a:schemeClr val="tx1"/>
@@ -33908,7 +33908,7 @@
                 <a:tailEnd/>
               </a14:hiddenLine>
             </a:ext>
-            <a:ext uri="{AF507438-7753-43E0-B8FC-AC1667EBCBE1}">
+            <a:ext uri="{AF507438-7753-43e0-B8FC-AC1667EBCBE1}">
               <a14:hiddenEffects xmlns:a14="http://schemas.microsoft.com/office/drawing/2010/main">
                 <a:effectLst>
                   <a:outerShdw dist="35921" dir="2700000" algn="ctr" rotWithShape="0">
@@ -33955,14 +33955,14 @@
           </a:ln>
           <a:effectLst/>
           <a:extLst>
-            <a:ext uri="{909E8E84-426E-40DD-AFC4-6F175D3DCCD1}">
+            <a:ext uri="{909E8E84-426E-40dd-AFC4-6F175D3DCCD1}">
               <a14:hiddenFill xmlns:a14="http://schemas.microsoft.com/office/drawing/2010/main">
                 <a:solidFill>
                   <a:schemeClr val="accent1"/>
                 </a:solidFill>
               </a14:hiddenFill>
             </a:ext>
-            <a:ext uri="{91240B29-F687-4F45-9708-019B960494DF}">
+            <a:ext uri="{91240B29-F687-4f45-9708-019B960494DF}">
               <a14:hiddenLine xmlns:a14="http://schemas.microsoft.com/office/drawing/2010/main" w="9525">
                 <a:solidFill>
                   <a:schemeClr val="tx1"/>
@@ -33972,7 +33972,7 @@
                 <a:tailEnd/>
               </a14:hiddenLine>
             </a:ext>
-            <a:ext uri="{AF507438-7753-43E0-B8FC-AC1667EBCBE1}">
+            <a:ext uri="{AF507438-7753-43e0-B8FC-AC1667EBCBE1}">
               <a14:hiddenEffects xmlns:a14="http://schemas.microsoft.com/office/drawing/2010/main">
                 <a:effectLst>
                   <a:outerShdw dist="35921" dir="2700000" algn="ctr" rotWithShape="0">
@@ -34464,14 +34464,14 @@
           </a:ln>
           <a:effectLst/>
           <a:extLst>
-            <a:ext uri="{909E8E84-426E-40DD-AFC4-6F175D3DCCD1}">
+            <a:ext uri="{909E8E84-426E-40dd-AFC4-6F175D3DCCD1}">
               <a14:hiddenFill xmlns:a14="http://schemas.microsoft.com/office/drawing/2010/main">
                 <a:solidFill>
                   <a:schemeClr val="accent1"/>
                 </a:solidFill>
               </a14:hiddenFill>
             </a:ext>
-            <a:ext uri="{91240B29-F687-4F45-9708-019B960494DF}">
+            <a:ext uri="{91240B29-F687-4f45-9708-019B960494DF}">
               <a14:hiddenLine xmlns:a14="http://schemas.microsoft.com/office/drawing/2010/main" w="9525">
                 <a:solidFill>
                   <a:schemeClr val="tx1"/>
@@ -34481,7 +34481,7 @@
                 <a:tailEnd/>
               </a14:hiddenLine>
             </a:ext>
-            <a:ext uri="{AF507438-7753-43E0-B8FC-AC1667EBCBE1}">
+            <a:ext uri="{AF507438-7753-43e0-B8FC-AC1667EBCBE1}">
               <a14:hiddenEffects xmlns:a14="http://schemas.microsoft.com/office/drawing/2010/main">
                 <a:effectLst>
                   <a:outerShdw dist="35921" dir="2700000" algn="ctr" rotWithShape="0">
@@ -34498,13 +34498,13 @@
   <p:clrMapOvr>
     <a:masterClrMapping/>
   </p:clrMapOvr>
-  <p:transition spd="med">
+  <p:transition xmlns:p14="http://schemas.microsoft.com/office/powerpoint/2010/main" spd="med">
     <p:wipe dir="r"/>
   </p:transition>
   <p:timing>
     <p:tnLst>
       <p:par>
-        <p:cTn id="1" dur="indefinite" restart="never" nodeType="tmRoot">
+        <p:cTn xmlns:p14="http://schemas.microsoft.com/office/powerpoint/2010/main" id="1" dur="indefinite" restart="never" nodeType="tmRoot">
           <p:childTnLst>
             <p:seq concurrent="1" nextAc="seek">
               <p:cTn id="2" dur="indefinite" nodeType="mainSeq"/>
@@ -34736,13 +34736,13 @@
   <p:clrMapOvr>
     <a:masterClrMapping/>
   </p:clrMapOvr>
-  <p:transition spd="med">
+  <p:transition xmlns:p14="http://schemas.microsoft.com/office/powerpoint/2010/main" spd="med">
     <p:wipe dir="r"/>
   </p:transition>
   <p:timing>
     <p:tnLst>
       <p:par>
-        <p:cTn id="1" dur="indefinite" restart="never" nodeType="tmRoot">
+        <p:cTn xmlns:p14="http://schemas.microsoft.com/office/powerpoint/2010/main" id="1" dur="indefinite" restart="never" nodeType="tmRoot">
           <p:childTnLst>
             <p:seq concurrent="1" nextAc="seek">
               <p:cTn id="2" dur="indefinite" nodeType="mainSeq"/>
@@ -35200,13 +35200,13 @@
   <p:clrMapOvr>
     <a:masterClrMapping/>
   </p:clrMapOvr>
-  <p:transition spd="med">
+  <p:transition xmlns:p14="http://schemas.microsoft.com/office/powerpoint/2010/main" spd="med">
     <p:wipe dir="r"/>
   </p:transition>
   <p:timing>
     <p:tnLst>
       <p:par>
-        <p:cTn id="1" dur="indefinite" restart="never" nodeType="tmRoot">
+        <p:cTn xmlns:p14="http://schemas.microsoft.com/office/powerpoint/2010/main" id="1" dur="indefinite" restart="never" nodeType="tmRoot">
           <p:childTnLst>
             <p:seq concurrent="1" nextAc="seek">
               <p:cTn id="2" dur="indefinite" nodeType="mainSeq"/>
@@ -35429,13 +35429,13 @@
   <p:clrMapOvr>
     <a:masterClrMapping/>
   </p:clrMapOvr>
-  <p:transition spd="med">
+  <p:transition xmlns:p14="http://schemas.microsoft.com/office/powerpoint/2010/main" spd="med">
     <p:wipe dir="r"/>
   </p:transition>
   <p:timing>
     <p:tnLst>
       <p:par>
-        <p:cTn id="1" dur="indefinite" restart="never" nodeType="tmRoot">
+        <p:cTn xmlns:p14="http://schemas.microsoft.com/office/powerpoint/2010/main" id="1" dur="indefinite" restart="never" nodeType="tmRoot">
           <p:childTnLst>
             <p:seq concurrent="1" nextAc="seek">
               <p:cTn id="2" dur="indefinite" nodeType="mainSeq"/>
@@ -35841,13 +35841,13 @@
   <p:clrMapOvr>
     <a:masterClrMapping/>
   </p:clrMapOvr>
-  <p:transition spd="med">
+  <p:transition xmlns:p14="http://schemas.microsoft.com/office/powerpoint/2010/main" spd="med">
     <p:wipe dir="r"/>
   </p:transition>
   <p:timing>
     <p:tnLst>
       <p:par>
-        <p:cTn id="1" dur="indefinite" restart="never" nodeType="tmRoot">
+        <p:cTn xmlns:p14="http://schemas.microsoft.com/office/powerpoint/2010/main" id="1" dur="indefinite" restart="never" nodeType="tmRoot">
           <p:childTnLst>
             <p:seq concurrent="1" nextAc="seek">
               <p:cTn id="2" dur="indefinite" nodeType="mainSeq"/>
@@ -36237,13 +36237,13 @@
   <p:clrMapOvr>
     <a:masterClrMapping/>
   </p:clrMapOvr>
-  <p:transition spd="med">
+  <p:transition xmlns:p14="http://schemas.microsoft.com/office/powerpoint/2010/main" spd="med">
     <p:wipe dir="r"/>
   </p:transition>
   <p:timing>
     <p:tnLst>
       <p:par>
-        <p:cTn id="1" dur="indefinite" restart="never" nodeType="tmRoot">
+        <p:cTn xmlns:p14="http://schemas.microsoft.com/office/powerpoint/2010/main" id="1" dur="indefinite" restart="never" nodeType="tmRoot">
           <p:childTnLst>
             <p:seq concurrent="1" nextAc="seek">
               <p:cTn id="2" dur="indefinite" nodeType="mainSeq"/>
@@ -36535,13 +36535,13 @@
   <p:clrMapOvr>
     <a:masterClrMapping/>
   </p:clrMapOvr>
-  <p:transition spd="med">
+  <p:transition xmlns:p14="http://schemas.microsoft.com/office/powerpoint/2010/main" spd="med">
     <p:wipe dir="r"/>
   </p:transition>
   <p:timing>
     <p:tnLst>
       <p:par>
-        <p:cTn id="1" dur="indefinite" restart="never" nodeType="tmRoot">
+        <p:cTn xmlns:p14="http://schemas.microsoft.com/office/powerpoint/2010/main" id="1" dur="indefinite" restart="never" nodeType="tmRoot">
           <p:childTnLst>
             <p:seq concurrent="1" nextAc="seek">
               <p:cTn id="2" dur="indefinite" nodeType="mainSeq"/>
@@ -36764,13 +36764,13 @@
   <p:clrMapOvr>
     <a:masterClrMapping/>
   </p:clrMapOvr>
-  <p:transition spd="med">
+  <p:transition xmlns:p14="http://schemas.microsoft.com/office/powerpoint/2010/main" spd="med">
     <p:wipe dir="r"/>
   </p:transition>
   <p:timing>
     <p:tnLst>
       <p:par>
-        <p:cTn id="1" dur="indefinite" restart="never" nodeType="tmRoot">
+        <p:cTn xmlns:p14="http://schemas.microsoft.com/office/powerpoint/2010/main" id="1" dur="indefinite" restart="never" nodeType="tmRoot">
           <p:childTnLst>
             <p:seq concurrent="1" nextAc="seek">
               <p:cTn id="2" dur="indefinite" nodeType="mainSeq"/>
@@ -37070,13 +37070,13 @@
   <p:clrMapOvr>
     <a:masterClrMapping/>
   </p:clrMapOvr>
-  <p:transition spd="med">
+  <p:transition xmlns:p14="http://schemas.microsoft.com/office/powerpoint/2010/main" spd="med">
     <p:wipe dir="r"/>
   </p:transition>
   <p:timing>
     <p:tnLst>
       <p:par>
-        <p:cTn id="1" dur="indefinite" restart="never" nodeType="tmRoot">
+        <p:cTn xmlns:p14="http://schemas.microsoft.com/office/powerpoint/2010/main" id="1" dur="indefinite" restart="never" nodeType="tmRoot">
           <p:childTnLst>
             <p:seq concurrent="1" nextAc="seek">
               <p:cTn id="2" dur="indefinite" nodeType="mainSeq"/>
@@ -37311,7 +37311,7 @@
                   <a:srgbClr val="4C4C4C"/>
                 </a:solidFill>
               </a:rPr>
-              <a:t>Create a directory $TRAINING_HOME and unzip eXoPlatform-3.0.0-GA.zip</a:t>
+              <a:t>Create a directory $TRAINING_HOME and unzip eXoPlatform-3.0.5.zip</a:t>
             </a:r>
           </a:p>
           <a:p>
@@ -37405,7 +37405,7 @@
                   <a:srgbClr val="4C4C4C"/>
                 </a:solidFill>
               </a:rPr>
-              <a:t>...\eXoPlatform-3.0.0-GA\bin\tomcat6-bundle\bin</a:t>
+              <a:t>...\eXoPlatform-3.0.5\bin\tomcat6-bundle</a:t>
             </a:r>
           </a:p>
           <a:p>
@@ -37499,7 +37499,23 @@
                   <a:srgbClr val="4C4C4C"/>
                 </a:solidFill>
               </a:rPr>
-              <a:t>Linux / Mac OS : ./gatein.sh run</a:t>
+              <a:t>Linux / Mac OS : ./</a:t>
+            </a:r>
+            <a:r>
+              <a:rPr lang="en-GB" sz="2000" b="1" i="1" dirty="0" err="1" smtClean="0">
+                <a:solidFill>
+                  <a:srgbClr val="4C4C4C"/>
+                </a:solidFill>
+              </a:rPr>
+              <a:t>start_eXo.sh</a:t>
+            </a:r>
+            <a:r>
+              <a:rPr lang="en-GB" sz="2000" b="1" i="1" dirty="0" smtClean="0">
+                <a:solidFill>
+                  <a:srgbClr val="4C4C4C"/>
+                </a:solidFill>
+              </a:rPr>
+              <a:t> run</a:t>
             </a:r>
           </a:p>
           <a:p>
@@ -37554,7 +37570,7 @@
                   <a:srgbClr val="4C4C4C"/>
                 </a:solidFill>
               </a:rPr>
-              <a:t>gatein</a:t>
+              <a:t>start_eXo</a:t>
             </a:r>
             <a:r>
               <a:rPr lang="en-GB" sz="2000" b="1" i="1" dirty="0" smtClean="0">
@@ -37852,13 +37868,13 @@
   <p:clrMapOvr>
     <a:masterClrMapping/>
   </p:clrMapOvr>
-  <p:transition spd="med">
+  <p:transition xmlns:p14="http://schemas.microsoft.com/office/powerpoint/2010/main" spd="med">
     <p:wipe dir="r"/>
   </p:transition>
   <p:timing>
     <p:tnLst>
       <p:par>
-        <p:cTn id="1" dur="indefinite" restart="never" nodeType="tmRoot">
+        <p:cTn xmlns:p14="http://schemas.microsoft.com/office/powerpoint/2010/main" id="1" dur="indefinite" restart="never" nodeType="tmRoot">
           <p:childTnLst>
             <p:seq concurrent="1" nextAc="seek">
               <p:cTn id="2" dur="indefinite" nodeType="mainSeq"/>
@@ -38156,7 +38172,23 @@
                   <a:schemeClr val="tx1"/>
                 </a:solidFill>
               </a:rPr>
-              <a:t>You can also use : ./gatein.sh stop</a:t>
+              <a:t>You can also use : ./</a:t>
+            </a:r>
+            <a:r>
+              <a:rPr lang="en-US" sz="2000" b="1" i="1" dirty="0" err="1" smtClean="0">
+                <a:solidFill>
+                  <a:schemeClr val="tx1"/>
+                </a:solidFill>
+              </a:rPr>
+              <a:t>stop_eXo.sh</a:t>
+            </a:r>
+            <a:r>
+              <a:rPr lang="en-US" sz="2000" b="1" i="1" dirty="0" smtClean="0">
+                <a:solidFill>
+                  <a:schemeClr val="tx1"/>
+                </a:solidFill>
+              </a:rPr>
+              <a:t> stop</a:t>
             </a:r>
           </a:p>
           <a:p>
@@ -38203,7 +38235,7 @@
                   <a:schemeClr val="tx1"/>
                 </a:solidFill>
               </a:rPr>
-              <a:t>To re-init and get the default configuration, delete :</a:t>
+              <a:t>To re-init and get the default configuration (starting from scratch), delete :</a:t>
             </a:r>
           </a:p>
           <a:p>
@@ -38258,7 +38290,7 @@
                   <a:schemeClr val="tx1"/>
                 </a:solidFill>
               </a:rPr>
-              <a:t>eXoPlatform-3.0.0-GA\bin\tomcat6-bundle\</a:t>
+              <a:t>eXoPlatform-3.0.5\bin\tomcat6-bundle\</a:t>
             </a:r>
             <a:r>
               <a:rPr lang="en-US" sz="2000" b="1" i="1" dirty="0" err="1" smtClean="0">
@@ -38321,7 +38353,7 @@
                   <a:schemeClr val="tx1"/>
                 </a:solidFill>
               </a:rPr>
-              <a:t>../eXoPlatform-3.0.0-GA\bin\tomcat6-bundle\work</a:t>
+              <a:t>../eXoPlatform-3.0.5\bin\tomcat6-bundle\work</a:t>
             </a:r>
           </a:p>
           <a:p>
@@ -38368,7 +38400,7 @@
                   <a:schemeClr val="tx1"/>
                 </a:solidFill>
               </a:rPr>
-              <a:t>../eXoPlatform-3.0.0-GA\bin\tomcat6-bundle\temp</a:t>
+              <a:t>../eXoPlatform-3.0.5\bin\tomcat6-bundle\temp</a:t>
             </a:r>
             <a:endParaRPr lang="en-GB" sz="1800" b="1" i="1" dirty="0">
               <a:solidFill>
@@ -38383,13 +38415,13 @@
   <p:clrMapOvr>
     <a:masterClrMapping/>
   </p:clrMapOvr>
-  <p:transition spd="med">
+  <p:transition xmlns:p14="http://schemas.microsoft.com/office/powerpoint/2010/main" spd="med">
     <p:wipe dir="r"/>
   </p:transition>
   <p:timing>
     <p:tnLst>
       <p:par>
-        <p:cTn id="1" dur="indefinite" restart="never" nodeType="tmRoot">
+        <p:cTn xmlns:p14="http://schemas.microsoft.com/office/powerpoint/2010/main" id="1" dur="indefinite" restart="never" nodeType="tmRoot">
           <p:childTnLst>
             <p:seq concurrent="1" nextAc="seek">
               <p:cTn id="2" dur="indefinite" nodeType="mainSeq"/>
@@ -38966,13 +38998,13 @@
   <p:clrMapOvr>
     <a:masterClrMapping/>
   </p:clrMapOvr>
-  <p:transition spd="med">
+  <p:transition xmlns:p14="http://schemas.microsoft.com/office/powerpoint/2010/main" spd="med">
     <p:wipe dir="r"/>
   </p:transition>
   <p:timing>
     <p:tnLst>
       <p:par>
-        <p:cTn id="1" dur="indefinite" restart="never" nodeType="tmRoot">
+        <p:cTn xmlns:p14="http://schemas.microsoft.com/office/powerpoint/2010/main" id="1" dur="indefinite" restart="never" nodeType="tmRoot">
           <p:childTnLst>
             <p:seq concurrent="1" nextAc="seek">
               <p:cTn id="2" dur="indefinite" nodeType="mainSeq"/>
@@ -39506,13 +39538,13 @@
   <p:clrMapOvr>
     <a:masterClrMapping/>
   </p:clrMapOvr>
-  <p:transition spd="med">
+  <p:transition xmlns:p14="http://schemas.microsoft.com/office/powerpoint/2010/main" spd="med">
     <p:wipe dir="r"/>
   </p:transition>
   <p:timing>
     <p:tnLst>
       <p:par>
-        <p:cTn id="1" dur="indefinite" restart="never" nodeType="tmRoot">
+        <p:cTn xmlns:p14="http://schemas.microsoft.com/office/powerpoint/2010/main" id="1" dur="indefinite" restart="never" nodeType="tmRoot">
           <p:childTnLst>
             <p:seq concurrent="1" nextAc="seek">
               <p:cTn id="2" dur="indefinite" nodeType="mainSeq"/>
@@ -39744,13 +39776,13 @@
   <p:clrMapOvr>
     <a:masterClrMapping/>
   </p:clrMapOvr>
-  <p:transition spd="med">
+  <p:transition xmlns:p14="http://schemas.microsoft.com/office/powerpoint/2010/main" spd="med">
     <p:wipe dir="r"/>
   </p:transition>
   <p:timing>
     <p:tnLst>
       <p:par>
-        <p:cTn id="1" dur="indefinite" restart="never" nodeType="tmRoot">
+        <p:cTn xmlns:p14="http://schemas.microsoft.com/office/powerpoint/2010/main" id="1" dur="indefinite" restart="never" nodeType="tmRoot">
           <p:childTnLst>
             <p:seq concurrent="1" nextAc="seek">
               <p:cTn id="2" dur="indefinite" nodeType="mainSeq"/>
@@ -40260,14 +40292,14 @@
           </a:ln>
           <a:effectLst/>
           <a:extLst>
-            <a:ext uri="{909E8E84-426E-40DD-AFC4-6F175D3DCCD1}">
+            <a:ext uri="{909E8E84-426E-40dd-AFC4-6F175D3DCCD1}">
               <a14:hiddenFill xmlns:a14="http://schemas.microsoft.com/office/drawing/2010/main">
                 <a:solidFill>
                   <a:schemeClr val="accent1"/>
                 </a:solidFill>
               </a14:hiddenFill>
             </a:ext>
-            <a:ext uri="{91240B29-F687-4F45-9708-019B960494DF}">
+            <a:ext uri="{91240B29-F687-4f45-9708-019B960494DF}">
               <a14:hiddenLine xmlns:a14="http://schemas.microsoft.com/office/drawing/2010/main" w="9525">
                 <a:solidFill>
                   <a:schemeClr val="tx1"/>
@@ -40277,7 +40309,7 @@
                 <a:tailEnd/>
               </a14:hiddenLine>
             </a:ext>
-            <a:ext uri="{AF507438-7753-43E0-B8FC-AC1667EBCBE1}">
+            <a:ext uri="{AF507438-7753-43e0-B8FC-AC1667EBCBE1}">
               <a14:hiddenEffects xmlns:a14="http://schemas.microsoft.com/office/drawing/2010/main">
                 <a:effectLst>
                   <a:outerShdw dist="35921" dir="2700000" algn="ctr" rotWithShape="0">
@@ -40294,13 +40326,13 @@
   <p:clrMapOvr>
     <a:masterClrMapping/>
   </p:clrMapOvr>
-  <p:transition spd="med">
+  <p:transition xmlns:p14="http://schemas.microsoft.com/office/powerpoint/2010/main" spd="med">
     <p:wipe dir="r"/>
   </p:transition>
   <p:timing>
     <p:tnLst>
       <p:par>
-        <p:cTn id="1" dur="indefinite" restart="never" nodeType="tmRoot">
+        <p:cTn xmlns:p14="http://schemas.microsoft.com/office/powerpoint/2010/main" id="1" dur="indefinite" restart="never" nodeType="tmRoot">
           <p:childTnLst>
             <p:seq concurrent="1" nextAc="seek">
               <p:cTn id="2" dur="indefinite" nodeType="mainSeq"/>
@@ -40940,13 +40972,13 @@
   <p:clrMapOvr>
     <a:masterClrMapping/>
   </p:clrMapOvr>
-  <p:transition spd="med">
+  <p:transition xmlns:p14="http://schemas.microsoft.com/office/powerpoint/2010/main" spd="med">
     <p:wipe dir="r"/>
   </p:transition>
   <p:timing>
     <p:tnLst>
       <p:par>
-        <p:cTn id="1" dur="indefinite" restart="never" nodeType="tmRoot">
+        <p:cTn xmlns:p14="http://schemas.microsoft.com/office/powerpoint/2010/main" id="1" dur="indefinite" restart="never" nodeType="tmRoot">
           <p:childTnLst>
             <p:seq concurrent="1" nextAc="seek">
               <p:cTn id="2" dur="indefinite" nodeType="mainSeq"/>
@@ -41291,13 +41323,13 @@
   <p:clrMapOvr>
     <a:masterClrMapping/>
   </p:clrMapOvr>
-  <p:transition spd="med">
+  <p:transition xmlns:p14="http://schemas.microsoft.com/office/powerpoint/2010/main" spd="med">
     <p:wipe dir="r"/>
   </p:transition>
   <p:timing>
     <p:tnLst>
       <p:par>
-        <p:cTn id="1" dur="indefinite" restart="never" nodeType="tmRoot">
+        <p:cTn xmlns:p14="http://schemas.microsoft.com/office/powerpoint/2010/main" id="1" dur="indefinite" restart="never" nodeType="tmRoot">
           <p:childTnLst>
             <p:seq concurrent="1" nextAc="seek">
               <p:cTn id="2" dur="indefinite" nodeType="mainSeq"/>
@@ -41448,11 +41480,11 @@
   <p:clrMapOvr>
     <a:masterClrMapping/>
   </p:clrMapOvr>
-  <p:transition/>
+  <p:transition xmlns:p14="http://schemas.microsoft.com/office/powerpoint/2010/main"/>
   <p:timing>
     <p:tnLst>
       <p:par>
-        <p:cTn id="1" dur="indefinite" restart="never" nodeType="tmRoot"/>
+        <p:cTn xmlns:p14="http://schemas.microsoft.com/office/powerpoint/2010/main" id="1" dur="indefinite" restart="never" nodeType="tmRoot"/>
       </p:par>
     </p:tnLst>
   </p:timing>
@@ -41889,13 +41921,13 @@
   <p:clrMapOvr>
     <a:masterClrMapping/>
   </p:clrMapOvr>
-  <p:transition spd="med">
+  <p:transition xmlns:p14="http://schemas.microsoft.com/office/powerpoint/2010/main" spd="med">
     <p:wipe dir="r"/>
   </p:transition>
   <p:timing>
     <p:tnLst>
       <p:par>
-        <p:cTn id="1" dur="indefinite" restart="never" nodeType="tmRoot">
+        <p:cTn xmlns:p14="http://schemas.microsoft.com/office/powerpoint/2010/main" id="1" dur="indefinite" restart="never" nodeType="tmRoot">
           <p:childTnLst>
             <p:seq concurrent="1" nextAc="seek">
               <p:cTn id="2" dur="indefinite" nodeType="mainSeq"/>
@@ -42261,13 +42293,13 @@
   <p:clrMapOvr>
     <a:masterClrMapping/>
   </p:clrMapOvr>
-  <p:transition spd="med">
+  <p:transition xmlns:p14="http://schemas.microsoft.com/office/powerpoint/2010/main" spd="med">
     <p:wipe dir="r"/>
   </p:transition>
   <p:timing>
     <p:tnLst>
       <p:par>
-        <p:cTn id="1" dur="indefinite" restart="never" nodeType="tmRoot">
+        <p:cTn xmlns:p14="http://schemas.microsoft.com/office/powerpoint/2010/main" id="1" dur="indefinite" restart="never" nodeType="tmRoot">
           <p:childTnLst>
             <p:seq concurrent="1" nextAc="seek">
               <p:cTn id="2" dur="indefinite" nodeType="mainSeq"/>
@@ -42586,13 +42618,13 @@
   <p:clrMapOvr>
     <a:masterClrMapping/>
   </p:clrMapOvr>
-  <p:transition spd="med">
+  <p:transition xmlns:p14="http://schemas.microsoft.com/office/powerpoint/2010/main" spd="med">
     <p:wipe dir="r"/>
   </p:transition>
   <p:timing>
     <p:tnLst>
       <p:par>
-        <p:cTn id="1" dur="indefinite" restart="never" nodeType="tmRoot">
+        <p:cTn xmlns:p14="http://schemas.microsoft.com/office/powerpoint/2010/main" id="1" dur="indefinite" restart="never" nodeType="tmRoot">
           <p:childTnLst>
             <p:seq concurrent="1" nextAc="seek">
               <p:cTn id="2" dur="indefinite" nodeType="mainSeq"/>
@@ -42911,13 +42943,13 @@
   <p:clrMapOvr>
     <a:masterClrMapping/>
   </p:clrMapOvr>
-  <p:transition spd="med">
+  <p:transition xmlns:p14="http://schemas.microsoft.com/office/powerpoint/2010/main" spd="med">
     <p:wipe dir="r"/>
   </p:transition>
   <p:timing>
     <p:tnLst>
       <p:par>
-        <p:cTn id="1" dur="indefinite" restart="never" nodeType="tmRoot">
+        <p:cTn xmlns:p14="http://schemas.microsoft.com/office/powerpoint/2010/main" id="1" dur="indefinite" restart="never" nodeType="tmRoot">
           <p:childTnLst>
             <p:seq concurrent="1" nextAc="seek">
               <p:cTn id="2" dur="indefinite" nodeType="mainSeq"/>
@@ -43024,7 +43056,15 @@
                   <a:srgbClr val="FFA300"/>
                 </a:solidFill>
               </a:rPr>
-              <a:t>Memberships: Remarks</a:t>
+              <a:t>General </a:t>
+            </a:r>
+            <a:r>
+              <a:rPr lang="en-GB" sz="3600" dirty="0" smtClean="0">
+                <a:solidFill>
+                  <a:srgbClr val="FFA300"/>
+                </a:solidFill>
+              </a:rPr>
+              <a:t>Remarks</a:t>
             </a:r>
             <a:endParaRPr lang="en-GB" sz="3600" dirty="0">
               <a:solidFill>
@@ -43339,13 +43379,13 @@
   <p:clrMapOvr>
     <a:masterClrMapping/>
   </p:clrMapOvr>
-  <p:transition spd="med">
+  <p:transition xmlns:p14="http://schemas.microsoft.com/office/powerpoint/2010/main" spd="med">
     <p:wipe dir="r"/>
   </p:transition>
   <p:timing>
     <p:tnLst>
       <p:par>
-        <p:cTn id="1" dur="indefinite" restart="never" nodeType="tmRoot">
+        <p:cTn xmlns:p14="http://schemas.microsoft.com/office/powerpoint/2010/main" id="1" dur="indefinite" restart="never" nodeType="tmRoot">
           <p:childTnLst>
             <p:seq concurrent="1" nextAc="seek">
               <p:cTn id="2" dur="indefinite" nodeType="mainSeq"/>
@@ -43904,21 +43944,8 @@
                   <a:schemeClr val="tx1"/>
                 </a:solidFill>
               </a:rPr>
-              <a:t>Create  a new subgroup in platform called </a:t>
-            </a:r>
-            <a:r>
-              <a:rPr lang="en-US" sz="2000" b="1" i="1" dirty="0" smtClean="0">
-                <a:solidFill>
-                  <a:schemeClr val="tx1"/>
-                </a:solidFill>
-              </a:rPr>
-              <a:t>“bike”.</a:t>
-            </a:r>
-            <a:endParaRPr lang="en-US" sz="2000" b="1" i="1" dirty="0" smtClean="0">
-              <a:solidFill>
-                <a:schemeClr val="tx1"/>
-              </a:solidFill>
-            </a:endParaRPr>
+              <a:t>Create  a new subgroup in platform called “bike”.</a:t>
+            </a:r>
           </a:p>
           <a:p>
             <a:pPr marL="258763" indent="-255588" hangingPunct="1">
@@ -44153,13 +44180,13 @@
   <p:clrMapOvr>
     <a:masterClrMapping/>
   </p:clrMapOvr>
-  <p:transition spd="med">
+  <p:transition xmlns:p14="http://schemas.microsoft.com/office/powerpoint/2010/main" spd="med">
     <p:wipe dir="r"/>
   </p:transition>
   <p:timing>
     <p:tnLst>
       <p:par>
-        <p:cTn id="1" dur="indefinite" restart="never" nodeType="tmRoot">
+        <p:cTn xmlns:p14="http://schemas.microsoft.com/office/powerpoint/2010/main" id="1" dur="indefinite" restart="never" nodeType="tmRoot">
           <p:childTnLst>
             <p:seq concurrent="1" nextAc="seek">
               <p:cTn id="2" dur="indefinite" nodeType="mainSeq"/>
@@ -44382,13 +44409,13 @@
   <p:clrMapOvr>
     <a:masterClrMapping/>
   </p:clrMapOvr>
-  <p:transition spd="med">
+  <p:transition xmlns:p14="http://schemas.microsoft.com/office/powerpoint/2010/main" spd="med">
     <p:wipe dir="r"/>
   </p:transition>
   <p:timing>
     <p:tnLst>
       <p:par>
-        <p:cTn id="1" dur="indefinite" restart="never" nodeType="tmRoot">
+        <p:cTn xmlns:p14="http://schemas.microsoft.com/office/powerpoint/2010/main" id="1" dur="indefinite" restart="never" nodeType="tmRoot">
           <p:childTnLst>
             <p:seq concurrent="1" nextAc="seek">
               <p:cTn id="2" dur="indefinite" nodeType="mainSeq"/>
@@ -44454,8 +44481,16 @@
           <a:p>
             <a:pPr eaLnBrk="1" hangingPunct="1"/>
             <a:r>
-              <a:rPr lang="en-US" smtClean="0"/>
-              <a:t>Why eXo Portal ?</a:t>
+              <a:rPr lang="en-US" dirty="0" smtClean="0"/>
+              <a:t>Why </a:t>
+            </a:r>
+            <a:r>
+              <a:rPr lang="en-US" dirty="0" err="1" smtClean="0"/>
+              <a:t>eXo</a:t>
+            </a:r>
+            <a:r>
+              <a:rPr lang="en-US" dirty="0" smtClean="0"/>
+              <a:t> Platform ?</a:t>
             </a:r>
           </a:p>
         </p:txBody>
@@ -44487,7 +44522,7 @@
             <a:pPr marL="584962" lvl="1" indent="-219361"/>
             <a:r>
               <a:rPr lang="en-US" dirty="0" smtClean="0"/>
-              <a:t>Standard Respect</a:t>
+              <a:t>Respect for Standards</a:t>
             </a:r>
           </a:p>
           <a:p>
@@ -44501,26 +44536,18 @@
             <a:pPr marL="584962" lvl="1" indent="-219361"/>
             <a:r>
               <a:rPr lang="en-US" dirty="0" smtClean="0"/>
-              <a:t>Integrated Applicative Suite</a:t>
+              <a:t>Integrated and Extensible</a:t>
             </a:r>
           </a:p>
           <a:p>
             <a:pPr marL="584962" lvl="1" indent="-219361"/>
             <a:r>
-              <a:rPr lang="en-US" dirty="0" err="1" smtClean="0"/>
-              <a:t>eXo</a:t>
+              <a:rPr lang="en-US" dirty="0"/>
+              <a:t>C</a:t>
             </a:r>
             <a:r>
               <a:rPr lang="en-US" dirty="0" smtClean="0"/>
-              <a:t> innovates (ex: </a:t>
-            </a:r>
-            <a:r>
-              <a:rPr lang="en-US" dirty="0" err="1" smtClean="0"/>
-              <a:t>WebOS</a:t>
-            </a:r>
-            <a:r>
-              <a:rPr lang="en-US" dirty="0" smtClean="0"/>
-              <a:t>)</a:t>
+              <a:t>ustomer-driven innovation (ex: cloud IDE, web OS)</a:t>
             </a:r>
           </a:p>
           <a:p>
@@ -44543,11 +44570,11 @@
   <p:clrMapOvr>
     <a:masterClrMapping/>
   </p:clrMapOvr>
-  <p:transition/>
+  <p:transition xmlns:p14="http://schemas.microsoft.com/office/powerpoint/2010/main"/>
   <p:timing>
     <p:tnLst>
       <p:par>
-        <p:cTn id="1" dur="indefinite" restart="never" nodeType="tmRoot"/>
+        <p:cTn xmlns:p14="http://schemas.microsoft.com/office/powerpoint/2010/main" id="1" dur="indefinite" restart="never" nodeType="tmRoot"/>
       </p:par>
     </p:tnLst>
   </p:timing>
@@ -44922,11 +44949,11 @@
   <p:clrMapOvr>
     <a:masterClrMapping/>
   </p:clrMapOvr>
-  <p:transition/>
+  <p:transition xmlns:p14="http://schemas.microsoft.com/office/powerpoint/2010/main"/>
   <p:timing>
     <p:tnLst>
       <p:par>
-        <p:cTn id="1" dur="indefinite" restart="never" nodeType="tmRoot"/>
+        <p:cTn xmlns:p14="http://schemas.microsoft.com/office/powerpoint/2010/main" id="1" dur="indefinite" restart="never" nodeType="tmRoot"/>
       </p:par>
     </p:tnLst>
   </p:timing>
@@ -45310,14 +45337,14 @@
           </a:ln>
           <a:effectLst/>
           <a:extLst>
-            <a:ext uri="{909E8E84-426E-40DD-AFC4-6F175D3DCCD1}">
+            <a:ext uri="{909E8E84-426E-40dd-AFC4-6F175D3DCCD1}">
               <a14:hiddenFill xmlns:a14="http://schemas.microsoft.com/office/drawing/2010/main">
                 <a:solidFill>
                   <a:schemeClr val="accent1"/>
                 </a:solidFill>
               </a14:hiddenFill>
             </a:ext>
-            <a:ext uri="{91240B29-F687-4F45-9708-019B960494DF}">
+            <a:ext uri="{91240B29-F687-4f45-9708-019B960494DF}">
               <a14:hiddenLine xmlns:a14="http://schemas.microsoft.com/office/drawing/2010/main" w="9525">
                 <a:solidFill>
                   <a:schemeClr val="tx1"/>
@@ -45327,7 +45354,7 @@
                 <a:tailEnd/>
               </a14:hiddenLine>
             </a:ext>
-            <a:ext uri="{AF507438-7753-43E0-B8FC-AC1667EBCBE1}">
+            <a:ext uri="{AF507438-7753-43e0-B8FC-AC1667EBCBE1}">
               <a14:hiddenEffects xmlns:a14="http://schemas.microsoft.com/office/drawing/2010/main">
                 <a:effectLst>
                   <a:outerShdw dist="35921" dir="2700000" algn="ctr" rotWithShape="0">
@@ -45349,13 +45376,13 @@
   <p:clrMapOvr>
     <a:masterClrMapping/>
   </p:clrMapOvr>
-  <p:transition spd="med">
+  <p:transition xmlns:p14="http://schemas.microsoft.com/office/powerpoint/2010/main" spd="med">
     <p:wipe dir="r"/>
   </p:transition>
   <p:timing>
     <p:tnLst>
       <p:par>
-        <p:cTn id="1" dur="indefinite" restart="never" nodeType="tmRoot">
+        <p:cTn xmlns:p14="http://schemas.microsoft.com/office/powerpoint/2010/main" id="1" dur="indefinite" restart="never" nodeType="tmRoot">
           <p:childTnLst>
             <p:seq concurrent="1" nextAc="seek">
               <p:cTn id="2" dur="indefinite" nodeType="mainSeq"/>
@@ -45580,14 +45607,14 @@
           </a:ln>
           <a:effectLst/>
           <a:extLst>
-            <a:ext uri="{909E8E84-426E-40DD-AFC4-6F175D3DCCD1}">
+            <a:ext uri="{909E8E84-426E-40dd-AFC4-6F175D3DCCD1}">
               <a14:hiddenFill xmlns:a14="http://schemas.microsoft.com/office/drawing/2010/main">
                 <a:solidFill>
                   <a:schemeClr val="accent1"/>
                 </a:solidFill>
               </a14:hiddenFill>
             </a:ext>
-            <a:ext uri="{91240B29-F687-4F45-9708-019B960494DF}">
+            <a:ext uri="{91240B29-F687-4f45-9708-019B960494DF}">
               <a14:hiddenLine xmlns:a14="http://schemas.microsoft.com/office/drawing/2010/main" w="9525">
                 <a:solidFill>
                   <a:schemeClr val="tx1"/>
@@ -45597,7 +45624,7 @@
                 <a:tailEnd/>
               </a14:hiddenLine>
             </a:ext>
-            <a:ext uri="{AF507438-7753-43E0-B8FC-AC1667EBCBE1}">
+            <a:ext uri="{AF507438-7753-43e0-B8FC-AC1667EBCBE1}">
               <a14:hiddenEffects xmlns:a14="http://schemas.microsoft.com/office/drawing/2010/main">
                 <a:effectLst>
                   <a:outerShdw dist="35921" dir="2700000" algn="ctr" rotWithShape="0">
@@ -45614,13 +45641,13 @@
   <p:clrMapOvr>
     <a:masterClrMapping/>
   </p:clrMapOvr>
-  <p:transition spd="med">
+  <p:transition xmlns:p14="http://schemas.microsoft.com/office/powerpoint/2010/main" spd="med">
     <p:wipe dir="r"/>
   </p:transition>
   <p:timing>
     <p:tnLst>
       <p:par>
-        <p:cTn id="1" dur="indefinite" restart="never" nodeType="tmRoot">
+        <p:cTn xmlns:p14="http://schemas.microsoft.com/office/powerpoint/2010/main" id="1" dur="indefinite" restart="never" nodeType="tmRoot">
           <p:childTnLst>
             <p:seq concurrent="1" nextAc="seek">
               <p:cTn id="2" dur="indefinite" nodeType="mainSeq"/>
@@ -45852,14 +45879,14 @@
           </a:ln>
           <a:effectLst/>
           <a:extLst>
-            <a:ext uri="{909E8E84-426E-40DD-AFC4-6F175D3DCCD1}">
+            <a:ext uri="{909E8E84-426E-40dd-AFC4-6F175D3DCCD1}">
               <a14:hiddenFill xmlns:a14="http://schemas.microsoft.com/office/drawing/2010/main">
                 <a:solidFill>
                   <a:schemeClr val="accent1"/>
                 </a:solidFill>
               </a14:hiddenFill>
             </a:ext>
-            <a:ext uri="{AF507438-7753-43E0-B8FC-AC1667EBCBE1}">
+            <a:ext uri="{AF507438-7753-43e0-B8FC-AC1667EBCBE1}">
               <a14:hiddenEffects xmlns:a14="http://schemas.microsoft.com/office/drawing/2010/main">
                 <a:effectLst>
                   <a:outerShdw dist="35921" dir="2700000" algn="ctr" rotWithShape="0">
@@ -45906,14 +45933,14 @@
           </a:ln>
           <a:effectLst/>
           <a:extLst>
-            <a:ext uri="{909E8E84-426E-40DD-AFC4-6F175D3DCCD1}">
+            <a:ext uri="{909E8E84-426E-40dd-AFC4-6F175D3DCCD1}">
               <a14:hiddenFill xmlns:a14="http://schemas.microsoft.com/office/drawing/2010/main">
                 <a:solidFill>
                   <a:schemeClr val="accent1"/>
                 </a:solidFill>
               </a14:hiddenFill>
             </a:ext>
-            <a:ext uri="{91240B29-F687-4F45-9708-019B960494DF}">
+            <a:ext uri="{91240B29-F687-4f45-9708-019B960494DF}">
               <a14:hiddenLine xmlns:a14="http://schemas.microsoft.com/office/drawing/2010/main" w="9525">
                 <a:solidFill>
                   <a:schemeClr val="tx1"/>
@@ -45923,7 +45950,7 @@
                 <a:tailEnd/>
               </a14:hiddenLine>
             </a:ext>
-            <a:ext uri="{AF507438-7753-43E0-B8FC-AC1667EBCBE1}">
+            <a:ext uri="{AF507438-7753-43e0-B8FC-AC1667EBCBE1}">
               <a14:hiddenEffects xmlns:a14="http://schemas.microsoft.com/office/drawing/2010/main">
                 <a:effectLst>
                   <a:outerShdw dist="35921" dir="2700000" algn="ctr" rotWithShape="0">
@@ -45945,13 +45972,13 @@
   <p:clrMapOvr>
     <a:masterClrMapping/>
   </p:clrMapOvr>
-  <p:transition spd="med">
+  <p:transition xmlns:p14="http://schemas.microsoft.com/office/powerpoint/2010/main" spd="med">
     <p:wipe dir="r"/>
   </p:transition>
   <p:timing>
     <p:tnLst>
       <p:par>
-        <p:cTn id="1" dur="indefinite" restart="never" nodeType="tmRoot">
+        <p:cTn xmlns:p14="http://schemas.microsoft.com/office/powerpoint/2010/main" id="1" dur="indefinite" restart="never" nodeType="tmRoot">
           <p:childTnLst>
             <p:seq concurrent="1" nextAc="seek">
               <p:cTn id="2" dur="indefinite" nodeType="mainSeq"/>

</xml_diff>